<commit_message>
Achat / Vente Cryptos
</commit_message>
<xml_diff>
--- a/Bitchest_slides.pptx
+++ b/Bitchest_slides.pptx
@@ -12,12 +12,12 @@
     <p:sldId id="260" r:id="rId6"/>
     <p:sldId id="261" r:id="rId7"/>
     <p:sldId id="262" r:id="rId8"/>
-    <p:sldId id="270" r:id="rId9"/>
-    <p:sldId id="263" r:id="rId10"/>
-    <p:sldId id="264" r:id="rId11"/>
-    <p:sldId id="265" r:id="rId12"/>
-    <p:sldId id="266" r:id="rId13"/>
-    <p:sldId id="267" r:id="rId14"/>
+    <p:sldId id="263" r:id="rId9"/>
+    <p:sldId id="264" r:id="rId10"/>
+    <p:sldId id="265" r:id="rId11"/>
+    <p:sldId id="266" r:id="rId12"/>
+    <p:sldId id="267" r:id="rId13"/>
+    <p:sldId id="270" r:id="rId14"/>
     <p:sldId id="268" r:id="rId15"/>
     <p:sldId id="269" r:id="rId16"/>
   </p:sldIdLst>
@@ -4034,7 +4034,7 @@
           <p:cNvPr id="2" name="Titre 1">
             <a:extLst>
               <a:ext uri="{FF2B5EF4-FFF2-40B4-BE49-F238E27FC236}">
-                <a16:creationId xmlns:a16="http://schemas.microsoft.com/office/drawing/2014/main" id="{565E8EC4-CF76-A924-F91E-B282BFC4807C}"/>
+                <a16:creationId xmlns:a16="http://schemas.microsoft.com/office/drawing/2014/main" id="{78AB3D23-74B9-58F2-EF1D-483AE96FC750}"/>
               </a:ext>
             </a:extLst>
           </p:cNvPr>
@@ -4045,7 +4045,12 @@
             <p:ph type="title"/>
           </p:nvPr>
         </p:nvSpPr>
-        <p:spPr/>
+        <p:spPr>
+          <a:xfrm>
+            <a:off x="1120948" y="13852"/>
+            <a:ext cx="9950103" cy="1507376"/>
+          </a:xfrm>
+        </p:spPr>
         <p:txBody>
           <a:bodyPr/>
           <a:lstStyle/>
@@ -4056,7 +4061,7 @@
                 <a:effectLst/>
                 <a:latin typeface="Söhne"/>
               </a:rPr>
-              <a:t>Parcours utilisateur - Client</a:t>
+              <a:t>Point de développement important</a:t>
             </a:r>
             <a:br>
               <a:rPr lang="fr-FR" b="1" i="0" dirty="0">
@@ -4073,7 +4078,7 @@
           <p:cNvPr id="3" name="Espace réservé du contenu 2">
             <a:extLst>
               <a:ext uri="{FF2B5EF4-FFF2-40B4-BE49-F238E27FC236}">
-                <a16:creationId xmlns:a16="http://schemas.microsoft.com/office/drawing/2014/main" id="{2907D7AF-8650-94AA-4605-6A06F1F13EEA}"/>
+                <a16:creationId xmlns:a16="http://schemas.microsoft.com/office/drawing/2014/main" id="{B83B4865-1D12-71F5-A4E3-84E0C4E906D2}"/>
               </a:ext>
             </a:extLst>
           </p:cNvPr>
@@ -4084,100 +4089,206 @@
             <p:ph idx="1"/>
           </p:nvPr>
         </p:nvSpPr>
-        <p:spPr/>
-        <p:txBody>
-          <a:bodyPr/>
-          <a:lstStyle/>
-          <a:p>
-            <a:pPr algn="l">
-              <a:buFont typeface="Arial" panose="020B0604020202020204" pitchFamily="34" charset="0"/>
-              <a:buChar char="•"/>
+        <p:spPr>
+          <a:xfrm>
+            <a:off x="1077361" y="1845426"/>
+            <a:ext cx="9950103" cy="4292140"/>
+          </a:xfrm>
+        </p:spPr>
+        <p:txBody>
+          <a:bodyPr>
+            <a:normAutofit fontScale="92500" lnSpcReduction="20000"/>
+          </a:bodyPr>
+          <a:lstStyle/>
+          <a:p>
+            <a:pPr marL="0" indent="0" algn="ctr">
+              <a:buNone/>
             </a:pPr>
             <a:r>
+              <a:rPr lang="fr-FR" b="0" i="0" dirty="0">
+                <a:effectLst/>
+                <a:latin typeface="Söhne"/>
+              </a:rPr>
+              <a:t>J'ai rencontré une difficulté en intégrant l'API pour récupérer les transactions de Cryptomonnaie, voici comment j'ai résolu ce problème …</a:t>
+            </a:r>
+            <a:br>
+              <a:rPr lang="fr-FR" b="0" i="0" dirty="0">
+                <a:effectLst/>
+                <a:latin typeface="Söhne"/>
+              </a:rPr>
+            </a:br>
+            <a:r>
+              <a:rPr lang="fr-FR" sz="2200" b="1" i="0" u="sng" dirty="0">
+                <a:effectLst/>
+                <a:latin typeface="Söhne"/>
+              </a:rPr>
+              <a:t>Solution mise en œuvre :</a:t>
+            </a:r>
+          </a:p>
+          <a:p>
+            <a:pPr algn="ctr">
+              <a:buFont typeface="+mj-lt"/>
+              <a:buAutoNum type="arabicPeriod"/>
+            </a:pPr>
+            <a:r>
+              <a:rPr lang="fr-FR" i="0" dirty="0">
+                <a:effectLst/>
+                <a:latin typeface="Söhne"/>
+              </a:rPr>
+              <a:t>Utilisation de </a:t>
+            </a:r>
+            <a:r>
+              <a:rPr lang="fr-FR" b="1" i="0" dirty="0" err="1">
+                <a:effectLst/>
+                <a:latin typeface="Söhne"/>
+              </a:rPr>
+              <a:t>useCallback</a:t>
+            </a:r>
+            <a:r>
+              <a:rPr lang="fr-FR" i="0" dirty="0">
+                <a:effectLst/>
+                <a:latin typeface="Söhne"/>
+              </a:rPr>
+              <a:t> et </a:t>
+            </a:r>
+            <a:r>
+              <a:rPr lang="fr-FR" b="1" i="0" dirty="0" err="1">
+                <a:effectLst/>
+                <a:latin typeface="Söhne"/>
+              </a:rPr>
+              <a:t>useEffect</a:t>
+            </a:r>
+            <a:r>
+              <a:rPr lang="fr-FR" i="0" dirty="0">
+                <a:effectLst/>
+                <a:latin typeface="Söhne"/>
+              </a:rPr>
+              <a:t> : Pour s'assurer que la requête de l'API soit effectuée de manière optimale et seulement lorsqu'il est nécessaire (quand </a:t>
+            </a:r>
+            <a:r>
+              <a:rPr lang="fr-FR" b="1" i="0" dirty="0" err="1">
+                <a:effectLst/>
+                <a:latin typeface="Söhne"/>
+              </a:rPr>
+              <a:t>isLoggedIn</a:t>
+            </a:r>
+            <a:r>
+              <a:rPr lang="fr-FR" i="0" dirty="0">
+                <a:effectLst/>
+                <a:latin typeface="Söhne"/>
+              </a:rPr>
+              <a:t> est modifié, ou quand le rôle de l'utilisateur change).</a:t>
+            </a:r>
+          </a:p>
+          <a:p>
+            <a:pPr algn="ctr">
+              <a:buFont typeface="+mj-lt"/>
+              <a:buAutoNum type="arabicPeriod"/>
+            </a:pPr>
+            <a:r>
+              <a:rPr lang="fr-FR" i="0" dirty="0">
+                <a:effectLst/>
+                <a:latin typeface="Söhne"/>
+              </a:rPr>
+              <a:t>Gestion d'erreurs avec </a:t>
+            </a:r>
+            <a:r>
+              <a:rPr lang="fr-FR" b="1" dirty="0">
+                <a:latin typeface="Söhne"/>
+              </a:rPr>
+              <a:t>A</a:t>
+            </a:r>
+            <a:r>
               <a:rPr lang="fr-FR" b="1" i="0" dirty="0">
                 <a:effectLst/>
                 <a:latin typeface="Söhne"/>
               </a:rPr>
-              <a:t>Connexion</a:t>
-            </a:r>
+              <a:t>xios</a:t>
+            </a:r>
+            <a:r>
+              <a:rPr lang="fr-FR" i="0" dirty="0">
+                <a:effectLst/>
+                <a:latin typeface="Söhne"/>
+              </a:rPr>
+              <a:t> : L'introduction d'un bloc </a:t>
+            </a:r>
+            <a:r>
+              <a:rPr lang="fr-FR" i="0" dirty="0" err="1">
+                <a:effectLst/>
+                <a:latin typeface="Söhne"/>
+              </a:rPr>
+              <a:t>try</a:t>
+            </a:r>
+            <a:r>
+              <a:rPr lang="fr-FR" i="0" dirty="0">
+                <a:effectLst/>
+                <a:latin typeface="Söhne"/>
+              </a:rPr>
+              <a:t>-catch autour de l'appel </a:t>
+            </a:r>
+            <a:r>
+              <a:rPr lang="fr-FR" b="1" dirty="0">
+                <a:latin typeface="Söhne"/>
+              </a:rPr>
+              <a:t>A</a:t>
+            </a:r>
+            <a:r>
+              <a:rPr lang="fr-FR" b="1" i="0" dirty="0">
+                <a:effectLst/>
+                <a:latin typeface="Söhne"/>
+              </a:rPr>
+              <a:t>xios</a:t>
+            </a:r>
+            <a:r>
+              <a:rPr lang="fr-FR" i="0" dirty="0">
+                <a:effectLst/>
+                <a:latin typeface="Söhne"/>
+              </a:rPr>
+              <a:t> a permis de traiter les erreurs potentielles, évitant ainsi les crashs inattendus de l'application.</a:t>
+            </a:r>
+          </a:p>
+          <a:p>
+            <a:pPr algn="ctr">
+              <a:buFont typeface="+mj-lt"/>
+              <a:buAutoNum type="arabicPeriod"/>
+            </a:pPr>
+            <a:r>
+              <a:rPr lang="fr-FR" i="0" dirty="0">
+                <a:effectLst/>
+                <a:latin typeface="Söhne"/>
+              </a:rPr>
+              <a:t>Mise à jour dynamique du solde : À chaque fois qu'un utilisateur se connecte, le solde est automatiquement récupéré, assurant que les données affichées sont toujours à jour.</a:t>
+            </a:r>
+          </a:p>
+          <a:p>
+            <a:pPr algn="ctr"/>
+            <a:endParaRPr lang="fr-FR" dirty="0"/>
+          </a:p>
+          <a:p>
+            <a:pPr marL="0" indent="0" algn="ctr">
+              <a:buNone/>
+            </a:pPr>
             <a:r>
               <a:rPr lang="fr-FR" b="0" i="0" dirty="0">
                 <a:effectLst/>
                 <a:latin typeface="Söhne"/>
               </a:rPr>
-              <a:t> via une adresse mail et un mot de passe.</a:t>
-            </a:r>
-          </a:p>
-          <a:p>
-            <a:pPr algn="l">
-              <a:buFont typeface="Arial" panose="020B0604020202020204" pitchFamily="34" charset="0"/>
-              <a:buChar char="•"/>
-            </a:pPr>
-            <a:r>
-              <a:rPr lang="fr-FR" b="1" i="0" dirty="0">
-                <a:effectLst/>
-                <a:latin typeface="Söhne"/>
-              </a:rPr>
-              <a:t>Fonctionnalités:</a:t>
-            </a:r>
-            <a:endParaRPr lang="fr-FR" b="0" i="0" dirty="0">
-              <a:effectLst/>
-              <a:latin typeface="Söhne"/>
-            </a:endParaRPr>
-          </a:p>
-          <a:p>
-            <a:pPr marL="742950" lvl="1" indent="-285750" algn="l">
-              <a:buFont typeface="Arial" panose="020B0604020202020204" pitchFamily="34" charset="0"/>
-              <a:buChar char="•"/>
-            </a:pPr>
+              <a:t>Une intégration réussie de l'API qui permet une récupération fiable des transactions et du solde de l'utilisateur, améliorant la robustesse et la fiabilité de l'application </a:t>
+            </a:r>
+            <a:r>
+              <a:rPr lang="fr-FR" b="0" i="0" dirty="0" err="1">
+                <a:effectLst/>
+                <a:latin typeface="Söhne"/>
+              </a:rPr>
+              <a:t>BitChest</a:t>
+            </a:r>
             <a:r>
               <a:rPr lang="fr-FR" b="0" i="0" dirty="0">
                 <a:effectLst/>
                 <a:latin typeface="Söhne"/>
               </a:rPr>
-              <a:t>Gestion des données personnelles</a:t>
-            </a:r>
-          </a:p>
-          <a:p>
-            <a:pPr marL="742950" lvl="1" indent="-285750" algn="l">
-              <a:buFont typeface="Arial" panose="020B0604020202020204" pitchFamily="34" charset="0"/>
-              <a:buChar char="•"/>
-            </a:pPr>
-            <a:r>
-              <a:rPr lang="fr-FR" b="0" i="0" dirty="0">
-                <a:effectLst/>
-                <a:latin typeface="Söhne"/>
-              </a:rPr>
-              <a:t>Vue et gestion du portefeuille: contenu, solde en euro</a:t>
-            </a:r>
-          </a:p>
-          <a:p>
-            <a:pPr marL="742950" lvl="1" indent="-285750" algn="l">
-              <a:buFont typeface="Arial" panose="020B0604020202020204" pitchFamily="34" charset="0"/>
-              <a:buChar char="•"/>
-            </a:pPr>
-            <a:r>
-              <a:rPr lang="fr-FR" b="0" i="0" dirty="0">
-                <a:effectLst/>
-                <a:latin typeface="Söhne"/>
-              </a:rPr>
-              <a:t>Transactions: vente et achat</a:t>
-            </a:r>
-          </a:p>
-          <a:p>
-            <a:pPr marL="742950" lvl="1" indent="-285750" algn="l">
-              <a:buFont typeface="Arial" panose="020B0604020202020204" pitchFamily="34" charset="0"/>
-              <a:buChar char="•"/>
-            </a:pPr>
-            <a:r>
-              <a:rPr lang="fr-FR" b="0" i="0" dirty="0">
-                <a:effectLst/>
-                <a:latin typeface="Söhne"/>
-              </a:rPr>
-              <a:t>Consultation des cours et historiques des cryptomonnaies</a:t>
-            </a:r>
-          </a:p>
-          <a:p>
+              <a:t>.</a:t>
+            </a:r>
             <a:endParaRPr lang="fr-FR" dirty="0"/>
           </a:p>
         </p:txBody>
@@ -4185,7 +4296,7 @@
     </p:spTree>
     <p:extLst>
       <p:ext uri="{BB962C8B-B14F-4D97-AF65-F5344CB8AC3E}">
-        <p14:creationId xmlns:p14="http://schemas.microsoft.com/office/powerpoint/2010/main" val="3829112462"/>
+        <p14:creationId xmlns:p14="http://schemas.microsoft.com/office/powerpoint/2010/main" val="2964505199"/>
       </p:ext>
     </p:extLst>
   </p:cSld>
@@ -4217,7 +4328,7 @@
           <p:cNvPr id="2" name="Titre 1">
             <a:extLst>
               <a:ext uri="{FF2B5EF4-FFF2-40B4-BE49-F238E27FC236}">
-                <a16:creationId xmlns:a16="http://schemas.microsoft.com/office/drawing/2014/main" id="{78AB3D23-74B9-58F2-EF1D-483AE96FC750}"/>
+                <a16:creationId xmlns:a16="http://schemas.microsoft.com/office/drawing/2014/main" id="{DD438667-38DD-0646-5B55-E5B5E3C2A618}"/>
               </a:ext>
             </a:extLst>
           </p:cNvPr>
@@ -4239,7 +4350,7 @@
                 <a:effectLst/>
                 <a:latin typeface="Söhne"/>
               </a:rPr>
-              <a:t>Point de développement important</a:t>
+              <a:t>Propositions d'amélioration</a:t>
             </a:r>
             <a:br>
               <a:rPr lang="fr-FR" b="1" i="0" dirty="0">
@@ -4256,7 +4367,7 @@
           <p:cNvPr id="3" name="Espace réservé du contenu 2">
             <a:extLst>
               <a:ext uri="{FF2B5EF4-FFF2-40B4-BE49-F238E27FC236}">
-                <a16:creationId xmlns:a16="http://schemas.microsoft.com/office/drawing/2014/main" id="{B83B4865-1D12-71F5-A4E3-84E0C4E906D2}"/>
+                <a16:creationId xmlns:a16="http://schemas.microsoft.com/office/drawing/2014/main" id="{FCE4C8DE-0A6C-87B1-BB8F-1B3D78D75BFF}"/>
               </a:ext>
             </a:extLst>
           </p:cNvPr>
@@ -4267,206 +4378,59 @@
             <p:ph idx="1"/>
           </p:nvPr>
         </p:nvSpPr>
-        <p:spPr>
-          <a:xfrm>
-            <a:off x="1077361" y="1845426"/>
-            <a:ext cx="9950103" cy="4292140"/>
-          </a:xfrm>
-        </p:spPr>
+        <p:spPr/>
         <p:txBody>
           <a:bodyPr>
-            <a:normAutofit fontScale="92500" lnSpcReduction="20000"/>
+            <a:normAutofit/>
           </a:bodyPr>
           <a:lstStyle/>
           <a:p>
-            <a:pPr marL="0" indent="0" algn="ctr">
-              <a:buNone/>
+            <a:pPr algn="ctr"/>
+            <a:r>
+              <a:rPr lang="fr-FR" b="0" i="0" dirty="0">
+                <a:effectLst/>
+                <a:latin typeface="Söhne"/>
+              </a:rPr>
+              <a:t>Intégration d'un système de notifications pour informer les utilisateurs des fluctuations majeures des prix.</a:t>
+            </a:r>
+          </a:p>
+          <a:p>
+            <a:pPr algn="ctr"/>
+            <a:r>
+              <a:rPr lang="fr-FR" b="0" i="0" dirty="0">
+                <a:effectLst/>
+                <a:latin typeface="Söhne"/>
+              </a:rPr>
+              <a:t>Pour aider à répondre rapidement aux questions courantes des utilisateurs, 24/7.</a:t>
+            </a:r>
+          </a:p>
+          <a:p>
+            <a:pPr algn="ctr">
+              <a:buFont typeface="Arial" panose="020B0604020202020204" pitchFamily="34" charset="0"/>
+              <a:buChar char="•"/>
             </a:pPr>
             <a:r>
               <a:rPr lang="fr-FR" b="0" i="0" dirty="0">
                 <a:effectLst/>
                 <a:latin typeface="Söhne"/>
               </a:rPr>
-              <a:t>J'ai rencontré une difficulté en intégrant l'API pour récupérer les transactions de Cryptomonnaie, voici comment j'ai résolu ce problème …</a:t>
-            </a:r>
-            <a:br>
+              <a:t>Permettre aux utilisateurs d'échanger directement des cryptomonnaies entre eux, sans intermédiaire.</a:t>
+            </a:r>
+          </a:p>
+          <a:p>
+            <a:pPr algn="ctr">
+              <a:buFont typeface="Arial" panose="020B0604020202020204" pitchFamily="34" charset="0"/>
+              <a:buChar char="•"/>
+            </a:pPr>
+            <a:r>
               <a:rPr lang="fr-FR" b="0" i="0" dirty="0">
                 <a:effectLst/>
                 <a:latin typeface="Söhne"/>
               </a:rPr>
-            </a:br>
-            <a:r>
-              <a:rPr lang="fr-FR" b="1" i="0" u="sng" dirty="0">
-                <a:effectLst/>
-                <a:latin typeface="Söhne"/>
-              </a:rPr>
-              <a:t>Solution mise en œuvre :</a:t>
-            </a:r>
-          </a:p>
-          <a:p>
-            <a:pPr algn="ctr">
-              <a:buFont typeface="+mj-lt"/>
-              <a:buAutoNum type="arabicPeriod"/>
-            </a:pPr>
-            <a:r>
-              <a:rPr lang="fr-FR" i="0" dirty="0">
-                <a:effectLst/>
-                <a:latin typeface="Söhne"/>
-              </a:rPr>
-              <a:t>Utilisation de </a:t>
-            </a:r>
-            <a:r>
-              <a:rPr lang="fr-FR" b="1" i="0" dirty="0" err="1">
-                <a:effectLst/>
-                <a:latin typeface="Söhne"/>
-              </a:rPr>
-              <a:t>useCallback</a:t>
-            </a:r>
-            <a:r>
-              <a:rPr lang="fr-FR" i="0" dirty="0">
-                <a:effectLst/>
-                <a:latin typeface="Söhne"/>
-              </a:rPr>
-              <a:t> et </a:t>
-            </a:r>
-            <a:r>
-              <a:rPr lang="fr-FR" b="1" i="0" dirty="0" err="1">
-                <a:effectLst/>
-                <a:latin typeface="Söhne"/>
-              </a:rPr>
-              <a:t>useEffect</a:t>
-            </a:r>
-            <a:r>
-              <a:rPr lang="fr-FR" i="0" dirty="0">
-                <a:effectLst/>
-                <a:latin typeface="Söhne"/>
-              </a:rPr>
-              <a:t> : Pour s'assurer que la requête de l'API soit effectuée de manière optimale et seulement lorsqu'il est nécessaire (quand </a:t>
-            </a:r>
-            <a:r>
-              <a:rPr lang="fr-FR" b="1" i="0" dirty="0" err="1">
-                <a:effectLst/>
-                <a:latin typeface="Söhne"/>
-              </a:rPr>
-              <a:t>isLoggedIn</a:t>
-            </a:r>
-            <a:r>
-              <a:rPr lang="fr-FR" i="0" dirty="0">
-                <a:effectLst/>
-                <a:latin typeface="Söhne"/>
-              </a:rPr>
-              <a:t> est modifié, ou quand le rôle de l'utilisateur change).</a:t>
-            </a:r>
-          </a:p>
-          <a:p>
-            <a:pPr algn="ctr">
-              <a:buFont typeface="+mj-lt"/>
-              <a:buAutoNum type="arabicPeriod"/>
-            </a:pPr>
-            <a:r>
-              <a:rPr lang="fr-FR" i="0" dirty="0">
-                <a:effectLst/>
-                <a:latin typeface="Söhne"/>
-              </a:rPr>
-              <a:t>Gestion d'erreurs avec </a:t>
-            </a:r>
-            <a:r>
-              <a:rPr lang="fr-FR" b="1" dirty="0">
-                <a:latin typeface="Söhne"/>
-              </a:rPr>
-              <a:t>A</a:t>
-            </a:r>
-            <a:r>
-              <a:rPr lang="fr-FR" b="1" i="0" dirty="0">
-                <a:effectLst/>
-                <a:latin typeface="Söhne"/>
-              </a:rPr>
-              <a:t>xios</a:t>
-            </a:r>
-            <a:r>
-              <a:rPr lang="fr-FR" i="0" dirty="0">
-                <a:effectLst/>
-                <a:latin typeface="Söhne"/>
-              </a:rPr>
-              <a:t> : L'introduction d'un bloc </a:t>
-            </a:r>
-            <a:r>
-              <a:rPr lang="fr-FR" i="0" dirty="0" err="1">
-                <a:effectLst/>
-                <a:latin typeface="Söhne"/>
-              </a:rPr>
-              <a:t>try</a:t>
-            </a:r>
-            <a:r>
-              <a:rPr lang="fr-FR" i="0" dirty="0">
-                <a:effectLst/>
-                <a:latin typeface="Söhne"/>
-              </a:rPr>
-              <a:t>-catch autour de l'appel </a:t>
-            </a:r>
-            <a:r>
-              <a:rPr lang="fr-FR" b="1" dirty="0">
-                <a:latin typeface="Söhne"/>
-              </a:rPr>
-              <a:t>A</a:t>
-            </a:r>
-            <a:r>
-              <a:rPr lang="fr-FR" b="1" i="0" dirty="0">
-                <a:effectLst/>
-                <a:latin typeface="Söhne"/>
-              </a:rPr>
-              <a:t>xios</a:t>
-            </a:r>
-            <a:r>
-              <a:rPr lang="fr-FR" i="0" dirty="0">
-                <a:effectLst/>
-                <a:latin typeface="Söhne"/>
-              </a:rPr>
-              <a:t> a permis de traiter les erreurs potentielles, évitant ainsi les crashs inattendus de l'application.</a:t>
-            </a:r>
-          </a:p>
-          <a:p>
-            <a:pPr algn="ctr">
-              <a:buFont typeface="+mj-lt"/>
-              <a:buAutoNum type="arabicPeriod"/>
-            </a:pPr>
-            <a:r>
-              <a:rPr lang="fr-FR" i="0" dirty="0">
-                <a:effectLst/>
-                <a:latin typeface="Söhne"/>
-              </a:rPr>
-              <a:t>Mise à jour dynamique du solde : À chaque fois qu'un utilisateur se connecte, le solde est automatiquement récupéré, assurant que les données affichées sont toujours à jour.</a:t>
-            </a:r>
-          </a:p>
-          <a:p>
-            <a:pPr algn="ctr"/>
-            <a:endParaRPr lang="fr-FR" dirty="0"/>
-          </a:p>
-          <a:p>
-            <a:pPr marL="0" indent="0" algn="ctr">
-              <a:buNone/>
-            </a:pPr>
-            <a:r>
-              <a:rPr lang="fr-FR" b="0" i="0" dirty="0">
-                <a:effectLst/>
-                <a:latin typeface="Söhne"/>
-              </a:rPr>
-              <a:t>Une intégration réussie de l'API qui permet une récupération fiable des transactions et du solde de l'utilisateur, améliorant la robustesse et la fiabilité de l'application </a:t>
-            </a:r>
-            <a:r>
-              <a:rPr lang="fr-FR" b="0" i="0" dirty="0" err="1">
-                <a:effectLst/>
-                <a:latin typeface="Söhne"/>
-              </a:rPr>
-              <a:t>BitChest</a:t>
-            </a:r>
-            <a:r>
-              <a:rPr lang="fr-FR" b="0" i="0" dirty="0">
-                <a:effectLst/>
-                <a:latin typeface="Söhne"/>
-              </a:rPr>
-              <a:t>.</a:t>
-            </a:r>
+              <a:t>Des récompenses ou des remises pour les utilisateurs actifs ou pour ceux qui parrainent de nouveaux membres.</a:t>
+            </a:r>
+          </a:p>
+          <a:p>
             <a:endParaRPr lang="fr-FR" dirty="0"/>
           </a:p>
         </p:txBody>
@@ -4474,7 +4438,7 @@
     </p:spTree>
     <p:extLst>
       <p:ext uri="{BB962C8B-B14F-4D97-AF65-F5344CB8AC3E}">
-        <p14:creationId xmlns:p14="http://schemas.microsoft.com/office/powerpoint/2010/main" val="2964505199"/>
+        <p14:creationId xmlns:p14="http://schemas.microsoft.com/office/powerpoint/2010/main" val="1158363623"/>
       </p:ext>
     </p:extLst>
   </p:cSld>
@@ -4506,7 +4470,7 @@
           <p:cNvPr id="2" name="Titre 1">
             <a:extLst>
               <a:ext uri="{FF2B5EF4-FFF2-40B4-BE49-F238E27FC236}">
-                <a16:creationId xmlns:a16="http://schemas.microsoft.com/office/drawing/2014/main" id="{DD438667-38DD-0646-5B55-E5B5E3C2A618}"/>
+                <a16:creationId xmlns:a16="http://schemas.microsoft.com/office/drawing/2014/main" id="{C2DE4956-0833-D464-E407-BBDFEAE832E7}"/>
               </a:ext>
             </a:extLst>
           </p:cNvPr>
@@ -4517,46 +4481,12 @@
             <p:ph type="title"/>
           </p:nvPr>
         </p:nvSpPr>
-        <p:spPr/>
-        <p:txBody>
-          <a:bodyPr/>
-          <a:lstStyle/>
-          <a:p>
-            <a:pPr algn="ctr"/>
-            <a:r>
-              <a:rPr lang="fr-FR" b="1" i="0" dirty="0">
-                <a:effectLst/>
-                <a:latin typeface="Söhne"/>
-              </a:rPr>
-              <a:t>Propositions d'amélioration</a:t>
-            </a:r>
-            <a:br>
-              <a:rPr lang="fr-FR" b="1" i="0" dirty="0">
-                <a:effectLst/>
-                <a:latin typeface="Söhne"/>
-              </a:rPr>
-            </a:br>
-            <a:endParaRPr lang="fr-FR" dirty="0"/>
-          </a:p>
-        </p:txBody>
-      </p:sp>
-      <p:sp>
-        <p:nvSpPr>
-          <p:cNvPr id="3" name="Espace réservé du contenu 2">
-            <a:extLst>
-              <a:ext uri="{FF2B5EF4-FFF2-40B4-BE49-F238E27FC236}">
-                <a16:creationId xmlns:a16="http://schemas.microsoft.com/office/drawing/2014/main" id="{FCE4C8DE-0A6C-87B1-BB8F-1B3D78D75BFF}"/>
-              </a:ext>
-            </a:extLst>
-          </p:cNvPr>
-          <p:cNvSpPr>
-            <a:spLocks noGrp="1"/>
-          </p:cNvSpPr>
-          <p:nvPr>
-            <p:ph idx="1"/>
-          </p:nvPr>
-        </p:nvSpPr>
-        <p:spPr/>
+        <p:spPr>
+          <a:xfrm>
+            <a:off x="1077362" y="0"/>
+            <a:ext cx="9950103" cy="1136073"/>
+          </a:xfrm>
+        </p:spPr>
         <p:txBody>
           <a:bodyPr>
             <a:normAutofit/>
@@ -4565,58 +4495,68 @@
           <a:p>
             <a:pPr algn="ctr"/>
             <a:r>
-              <a:rPr lang="fr-FR" b="0" i="0" dirty="0">
-                <a:effectLst/>
-                <a:latin typeface="Söhne"/>
-              </a:rPr>
-              <a:t>Intégration d'un système de notifications pour informer les utilisateurs des fluctuations majeures des prix.</a:t>
-            </a:r>
-          </a:p>
-          <a:p>
-            <a:pPr algn="ctr"/>
-            <a:r>
-              <a:rPr lang="fr-FR" b="0" i="0" dirty="0">
-                <a:effectLst/>
-                <a:latin typeface="Söhne"/>
-              </a:rPr>
-              <a:t>Pour aider à répondre rapidement aux questions courantes des utilisateurs, 24/7.</a:t>
-            </a:r>
-          </a:p>
-          <a:p>
-            <a:pPr algn="ctr">
-              <a:buFont typeface="Arial" panose="020B0604020202020204" pitchFamily="34" charset="0"/>
-              <a:buChar char="•"/>
+              <a:rPr lang="fr-FR" b="1" i="0" dirty="0">
+                <a:effectLst/>
+                <a:latin typeface="Söhne"/>
+              </a:rPr>
+              <a:t>Démo</a:t>
+            </a:r>
+            <a:br>
+              <a:rPr lang="fr-FR" b="1" i="0" dirty="0">
+                <a:effectLst/>
+                <a:latin typeface="Söhne"/>
+              </a:rPr>
+            </a:br>
+            <a:endParaRPr lang="fr-FR" dirty="0"/>
+          </a:p>
+        </p:txBody>
+      </p:sp>
+      <p:sp>
+        <p:nvSpPr>
+          <p:cNvPr id="3" name="Espace réservé du contenu 2">
+            <a:extLst>
+              <a:ext uri="{FF2B5EF4-FFF2-40B4-BE49-F238E27FC236}">
+                <a16:creationId xmlns:a16="http://schemas.microsoft.com/office/drawing/2014/main" id="{454ECB3B-001B-A605-39B0-A9E1F2C0494D}"/>
+              </a:ext>
+            </a:extLst>
+          </p:cNvPr>
+          <p:cNvSpPr>
+            <a:spLocks noGrp="1"/>
+          </p:cNvSpPr>
+          <p:nvPr>
+            <p:ph idx="1"/>
+          </p:nvPr>
+        </p:nvSpPr>
+        <p:spPr>
+          <a:xfrm>
+            <a:off x="1077362" y="581891"/>
+            <a:ext cx="9950103" cy="5358939"/>
+          </a:xfrm>
+        </p:spPr>
+        <p:txBody>
+          <a:bodyPr/>
+          <a:lstStyle/>
+          <a:p>
+            <a:pPr marL="0" indent="0" algn="ctr">
+              <a:buNone/>
             </a:pPr>
             <a:r>
-              <a:rPr lang="fr-FR" b="0" i="0" dirty="0">
-                <a:effectLst/>
-                <a:latin typeface="Söhne"/>
-              </a:rPr>
-              <a:t>Permettre aux utilisateurs d'échanger directement des cryptomonnaies entre eux, sans intermédiaire.</a:t>
-            </a:r>
-          </a:p>
-          <a:p>
-            <a:pPr algn="ctr">
-              <a:buFont typeface="Arial" panose="020B0604020202020204" pitchFamily="34" charset="0"/>
-              <a:buChar char="•"/>
+              <a:rPr lang="fr-FR" b="1" dirty="0"/>
+              <a:t>Parcours Admin : </a:t>
+            </a:r>
+          </a:p>
+          <a:p>
+            <a:pPr marL="0" indent="0" algn="ctr">
+              <a:buNone/>
             </a:pPr>
-            <a:r>
-              <a:rPr lang="fr-FR" b="0" i="0" dirty="0">
-                <a:effectLst/>
-                <a:latin typeface="Söhne"/>
-              </a:rPr>
-              <a:t>Des récompenses ou des remises pour les utilisateurs actifs ou pour ceux qui parrainent de nouveaux membres.</a:t>
-            </a:r>
-          </a:p>
-          <a:p>
-            <a:endParaRPr lang="fr-FR" dirty="0"/>
+            <a:endParaRPr lang="fr-FR" b="1" dirty="0"/>
           </a:p>
         </p:txBody>
       </p:sp>
     </p:spTree>
     <p:extLst>
       <p:ext uri="{BB962C8B-B14F-4D97-AF65-F5344CB8AC3E}">
-        <p14:creationId xmlns:p14="http://schemas.microsoft.com/office/powerpoint/2010/main" val="1158363623"/>
+        <p14:creationId xmlns:p14="http://schemas.microsoft.com/office/powerpoint/2010/main" val="505202050"/>
       </p:ext>
     </p:extLst>
   </p:cSld>
@@ -4659,9 +4599,16 @@
             <p:ph type="title"/>
           </p:nvPr>
         </p:nvSpPr>
-        <p:spPr/>
-        <p:txBody>
-          <a:bodyPr/>
+        <p:spPr>
+          <a:xfrm>
+            <a:off x="1077362" y="0"/>
+            <a:ext cx="9950103" cy="1136073"/>
+          </a:xfrm>
+        </p:spPr>
+        <p:txBody>
+          <a:bodyPr>
+            <a:normAutofit/>
+          </a:bodyPr>
           <a:lstStyle/>
           <a:p>
             <a:pPr algn="ctr"/>
@@ -4698,32 +4645,36 @@
             <p:ph idx="1"/>
           </p:nvPr>
         </p:nvSpPr>
-        <p:spPr/>
+        <p:spPr>
+          <a:xfrm>
+            <a:off x="1077362" y="581891"/>
+            <a:ext cx="9950103" cy="5358939"/>
+          </a:xfrm>
+        </p:spPr>
         <p:txBody>
           <a:bodyPr/>
           <a:lstStyle/>
           <a:p>
-            <a:r>
-              <a:rPr lang="fr-FR" b="0" i="0" dirty="0">
-                <a:solidFill>
-                  <a:srgbClr val="D1D5DB"/>
-                </a:solidFill>
-                <a:effectLst/>
-                <a:latin typeface="Söhne"/>
-              </a:rPr>
-              <a:t>Présentez quelques captures d'écran ou une démo rapide des fonctionnalités principales de l'interface.</a:t>
-            </a:r>
-            <a:br>
-              <a:rPr lang="fr-FR" dirty="0"/>
-            </a:br>
-            <a:endParaRPr lang="fr-FR" dirty="0"/>
+            <a:pPr marL="0" indent="0" algn="ctr">
+              <a:buNone/>
+            </a:pPr>
+            <a:r>
+              <a:rPr lang="fr-FR" b="1" dirty="0"/>
+              <a:t>Parcours Clients : </a:t>
+            </a:r>
+          </a:p>
+          <a:p>
+            <a:pPr marL="0" indent="0" algn="ctr">
+              <a:buNone/>
+            </a:pPr>
+            <a:endParaRPr lang="fr-FR" b="1" dirty="0"/>
           </a:p>
         </p:txBody>
       </p:sp>
     </p:spTree>
     <p:extLst>
       <p:ext uri="{BB962C8B-B14F-4D97-AF65-F5344CB8AC3E}">
-        <p14:creationId xmlns:p14="http://schemas.microsoft.com/office/powerpoint/2010/main" val="505202050"/>
+        <p14:creationId xmlns:p14="http://schemas.microsoft.com/office/powerpoint/2010/main" val="970483511"/>
       </p:ext>
     </p:extLst>
   </p:cSld>
@@ -4841,7 +4792,19 @@
                 <a:effectLst/>
                 <a:latin typeface="Söhne"/>
               </a:rPr>
-              <a:t>, nous avons franchi une étape cruciale vers une gestion plus transparente et intuitive des cryptomonnaies. Les défis étaient nombreux, mais avec les bons outils et une vision claire, nous avons créé une plateforme fiable et efficace. Merci de m'avoir accompagné dans cette aventure numérique. L'avenir de </a:t>
+              <a:t>, nous avons franchi une étape cruciale vers une gestion plus transparente et intuitive des cryptomonnaies. Les défis étaient nombreux, mais avec les bons outils et une vision claire, nous avons créé une plateforme fiable et efficace.</a:t>
+            </a:r>
+          </a:p>
+          <a:p>
+            <a:pPr marL="0" indent="0" algn="ctr">
+              <a:buNone/>
+            </a:pPr>
+            <a:r>
+              <a:rPr lang="fr-FR" b="0" i="0" dirty="0">
+                <a:effectLst/>
+                <a:latin typeface="Söhne"/>
+              </a:rPr>
+              <a:t> Merci de m'avoir accompagné dans cette aventure numérique. L'avenir de </a:t>
             </a:r>
             <a:r>
               <a:rPr lang="fr-FR" b="1" i="0" dirty="0" err="1">
@@ -4967,6 +4930,14 @@
 <file path=ppt/slides/slide2.xml><?xml version="1.0" encoding="utf-8"?>
 <p:sld xmlns:a="http://schemas.openxmlformats.org/drawingml/2006/main" xmlns:r="http://schemas.openxmlformats.org/officeDocument/2006/relationships" xmlns:p="http://schemas.openxmlformats.org/presentationml/2006/main">
   <p:cSld>
+    <p:bg>
+      <p:bgPr>
+        <a:solidFill>
+          <a:schemeClr val="bg1"/>
+        </a:solidFill>
+        <a:effectLst/>
+      </p:bgPr>
+    </p:bg>
     <p:spTree>
       <p:nvGrpSpPr>
         <p:cNvPr id="1" name=""/>
@@ -4981,6 +4952,82 @@
           <a:chExt cx="0" cy="0"/>
         </a:xfrm>
       </p:grpSpPr>
+      <p:sp useBgFill="1">
+        <p:nvSpPr>
+          <p:cNvPr id="12" name="Rectangle 11">
+            <a:extLst>
+              <a:ext uri="{FF2B5EF4-FFF2-40B4-BE49-F238E27FC236}">
+                <a16:creationId xmlns:a16="http://schemas.microsoft.com/office/drawing/2014/main" id="{0E4C1DE9-5E1B-46E3-BA0E-821C1334254B}"/>
+              </a:ext>
+              <a:ext uri="{C183D7F6-B498-43B3-948B-1728B52AA6E4}">
+                <adec:decorative xmlns:adec="http://schemas.microsoft.com/office/drawing/2017/decorative" val="1"/>
+              </a:ext>
+            </a:extLst>
+          </p:cNvPr>
+          <p:cNvSpPr>
+            <a:spLocks noGrp="1" noRot="1" noChangeAspect="1" noMove="1" noResize="1" noEditPoints="1" noAdjustHandles="1" noChangeArrowheads="1" noChangeShapeType="1" noTextEdit="1"/>
+          </p:cNvSpPr>
+          <p:nvPr>
+            <p:extLst>
+              <p:ext uri="{386F3935-93C4-4BCD-93E2-E3B085C9AB24}">
+                <p16:designElem xmlns:p16="http://schemas.microsoft.com/office/powerpoint/2015/main" val="1"/>
+              </p:ext>
+            </p:extLst>
+          </p:nvPr>
+        </p:nvSpPr>
+        <p:spPr>
+          <a:xfrm>
+            <a:off x="0" y="0"/>
+            <a:ext cx="12192000" cy="6858000"/>
+          </a:xfrm>
+          <a:prstGeom prst="rect">
+            <a:avLst/>
+          </a:prstGeom>
+          <a:ln w="12700" cap="flat" cmpd="sng" algn="ctr">
+            <a:noFill/>
+            <a:prstDash val="solid"/>
+            <a:miter lim="800000"/>
+          </a:ln>
+          <a:effectLst/>
+          <a:extLst>
+            <a:ext uri="{91240B29-F687-4F45-9708-019B960494DF}">
+              <a14:hiddenLine xmlns:a14="http://schemas.microsoft.com/office/drawing/2010/main" w="12700" cap="flat" cmpd="sng" algn="ctr">
+                <a:solidFill>
+                  <a:schemeClr val="accent1">
+                    <a:shade val="50000"/>
+                  </a:schemeClr>
+                </a:solidFill>
+                <a:prstDash val="solid"/>
+                <a:miter lim="800000"/>
+              </a14:hiddenLine>
+            </a:ext>
+          </a:extLst>
+        </p:spPr>
+        <p:style>
+          <a:lnRef idx="2">
+            <a:schemeClr val="accent1">
+              <a:shade val="50000"/>
+            </a:schemeClr>
+          </a:lnRef>
+          <a:fillRef idx="1">
+            <a:schemeClr val="accent1"/>
+          </a:fillRef>
+          <a:effectRef idx="0">
+            <a:schemeClr val="accent1"/>
+          </a:effectRef>
+          <a:fontRef idx="minor">
+            <a:schemeClr val="lt1"/>
+          </a:fontRef>
+        </p:style>
+        <p:txBody>
+          <a:bodyPr rtlCol="0" anchor="ctr"/>
+          <a:lstStyle/>
+          <a:p>
+            <a:pPr algn="ctr"/>
+            <a:endParaRPr lang="en-US"/>
+          </a:p>
+        </p:txBody>
+      </p:sp>
       <p:sp>
         <p:nvSpPr>
           <p:cNvPr id="2" name="Titre 1">
@@ -4997,89 +5044,104 @@
             <p:ph type="title"/>
           </p:nvPr>
         </p:nvSpPr>
-        <p:spPr/>
-        <p:txBody>
-          <a:bodyPr/>
-          <a:lstStyle/>
-          <a:p>
-            <a:pPr algn="ctr"/>
-            <a:r>
-              <a:rPr lang="fr-FR" b="1" dirty="0">
-                <a:effectLst/>
-                <a:latin typeface="Söhne"/>
-              </a:rPr>
-              <a:t>Introduction</a:t>
-            </a:r>
-            <a:br>
-              <a:rPr lang="fr-FR" b="1" i="0" dirty="0">
-                <a:effectLst/>
-                <a:latin typeface="Söhne"/>
-              </a:rPr>
-            </a:br>
-            <a:endParaRPr lang="fr-FR" dirty="0"/>
-          </a:p>
-        </p:txBody>
-      </p:sp>
-      <p:sp>
-        <p:nvSpPr>
-          <p:cNvPr id="3" name="Espace réservé du contenu 2">
-            <a:extLst>
-              <a:ext uri="{FF2B5EF4-FFF2-40B4-BE49-F238E27FC236}">
-                <a16:creationId xmlns:a16="http://schemas.microsoft.com/office/drawing/2014/main" id="{EE490145-F2A2-134B-1826-588A01CA2098}"/>
-              </a:ext>
-            </a:extLst>
-          </p:cNvPr>
-          <p:cNvSpPr>
-            <a:spLocks noGrp="1"/>
-          </p:cNvSpPr>
-          <p:nvPr>
-            <p:ph idx="1"/>
-          </p:nvPr>
-        </p:nvSpPr>
-        <p:spPr/>
+        <p:spPr>
+          <a:xfrm>
+            <a:off x="1077362" y="720435"/>
+            <a:ext cx="3188106" cy="1507375"/>
+          </a:xfrm>
+        </p:spPr>
         <p:txBody>
           <a:bodyPr>
             <a:normAutofit/>
           </a:bodyPr>
           <a:lstStyle/>
           <a:p>
-            <a:pPr algn="ctr"/>
-            <a:r>
+            <a:r>
+              <a:rPr lang="fr-FR" b="1" dirty="0">
+                <a:effectLst/>
+                <a:latin typeface="Söhne"/>
+              </a:rPr>
+              <a:t>Introduction</a:t>
+            </a:r>
+            <a:br>
               <a:rPr lang="fr-FR" b="1" i="0" dirty="0">
                 <a:effectLst/>
                 <a:latin typeface="Söhne"/>
               </a:rPr>
+            </a:br>
+            <a:endParaRPr lang="fr-FR"/>
+          </a:p>
+        </p:txBody>
+      </p:sp>
+      <p:sp>
+        <p:nvSpPr>
+          <p:cNvPr id="3" name="Espace réservé du contenu 2">
+            <a:extLst>
+              <a:ext uri="{FF2B5EF4-FFF2-40B4-BE49-F238E27FC236}">
+                <a16:creationId xmlns:a16="http://schemas.microsoft.com/office/drawing/2014/main" id="{EE490145-F2A2-134B-1826-588A01CA2098}"/>
+              </a:ext>
+            </a:extLst>
+          </p:cNvPr>
+          <p:cNvSpPr>
+            <a:spLocks noGrp="1"/>
+          </p:cNvSpPr>
+          <p:nvPr>
+            <p:ph idx="1"/>
+          </p:nvPr>
+        </p:nvSpPr>
+        <p:spPr>
+          <a:xfrm>
+            <a:off x="1077362" y="2434974"/>
+            <a:ext cx="3188106" cy="3505855"/>
+          </a:xfrm>
+        </p:spPr>
+        <p:txBody>
+          <a:bodyPr>
+            <a:normAutofit/>
+          </a:bodyPr>
+          <a:lstStyle/>
+          <a:p>
+            <a:pPr>
+              <a:lnSpc>
+                <a:spcPct val="110000"/>
+              </a:lnSpc>
+            </a:pPr>
+            <a:r>
+              <a:rPr lang="fr-FR" sz="1400" b="1" i="0">
+                <a:effectLst/>
+                <a:latin typeface="Söhne"/>
+              </a:rPr>
               <a:t>Qu'est-ce que l’application </a:t>
             </a:r>
             <a:r>
-              <a:rPr lang="fr-FR" b="1" i="0" dirty="0" err="1">
+              <a:rPr lang="fr-FR" sz="1400" b="1" i="0" err="1">
                 <a:effectLst/>
                 <a:latin typeface="Söhne"/>
               </a:rPr>
               <a:t>BitChest</a:t>
             </a:r>
             <a:r>
-              <a:rPr lang="fr-FR" b="1" i="0" dirty="0">
+              <a:rPr lang="fr-FR" sz="1400" b="1" i="0">
                 <a:effectLst/>
                 <a:latin typeface="Söhne"/>
               </a:rPr>
               <a:t> ?</a:t>
             </a:r>
             <a:r>
-              <a:rPr lang="fr-FR" b="0" i="0" dirty="0">
+              <a:rPr lang="fr-FR" sz="1400" b="0" i="0">
                 <a:effectLst/>
                 <a:latin typeface="Söhne"/>
               </a:rPr>
               <a:t> </a:t>
             </a:r>
             <a:br>
-              <a:rPr lang="fr-FR" b="0" i="0" dirty="0">
+              <a:rPr lang="fr-FR" sz="1400" b="0" i="0">
                 <a:effectLst/>
                 <a:latin typeface="Söhne"/>
               </a:rPr>
             </a:br>
             <a:r>
-              <a:rPr lang="fr-FR" b="0" i="0" dirty="0">
+              <a:rPr lang="fr-FR" sz="1400" b="0" i="0">
                 <a:effectLst/>
                 <a:latin typeface="Söhne"/>
               </a:rPr>
@@ -5087,19 +5149,22 @@
             </a:r>
           </a:p>
           <a:p>
-            <a:pPr algn="ctr">
+            <a:pPr>
+              <a:lnSpc>
+                <a:spcPct val="110000"/>
+              </a:lnSpc>
               <a:buFont typeface="Arial" panose="020B0604020202020204" pitchFamily="34" charset="0"/>
               <a:buChar char="•"/>
             </a:pPr>
             <a:r>
-              <a:rPr lang="fr-FR" b="1" i="0" dirty="0">
+              <a:rPr lang="fr-FR" sz="1400" b="1" i="0">
                 <a:effectLst/>
                 <a:latin typeface="Söhne"/>
               </a:rPr>
               <a:t>Objectif :</a:t>
             </a:r>
             <a:r>
-              <a:rPr lang="fr-FR" b="0" i="0" dirty="0">
+              <a:rPr lang="fr-FR" sz="1400" b="0" i="0">
                 <a:effectLst/>
                 <a:latin typeface="Söhne"/>
               </a:rPr>
@@ -5107,11 +5172,14 @@
             </a:r>
           </a:p>
           <a:p>
-            <a:pPr marL="0" indent="0" algn="ctr">
+            <a:pPr marL="0" indent="0">
+              <a:lnSpc>
+                <a:spcPct val="110000"/>
+              </a:lnSpc>
               <a:buNone/>
             </a:pPr>
             <a:r>
-              <a:rPr lang="fr-FR" b="0" i="0" dirty="0">
+              <a:rPr lang="fr-FR" sz="1400" b="0" i="0">
                 <a:effectLst/>
                 <a:latin typeface="Söhne"/>
               </a:rPr>
@@ -5119,12 +5187,15 @@
             </a:r>
           </a:p>
           <a:p>
-            <a:pPr marL="742950" lvl="1" indent="-285750" algn="ctr">
+            <a:pPr marL="742950" lvl="1" indent="-285750">
+              <a:lnSpc>
+                <a:spcPct val="110000"/>
+              </a:lnSpc>
               <a:buFont typeface="Arial" panose="020B0604020202020204" pitchFamily="34" charset="0"/>
               <a:buChar char="•"/>
             </a:pPr>
             <a:r>
-              <a:rPr lang="fr-FR" b="0" i="0" dirty="0">
+              <a:rPr lang="fr-FR" sz="1400" b="0" i="0">
                 <a:effectLst/>
                 <a:latin typeface="Söhne"/>
               </a:rPr>
@@ -5132,12 +5203,15 @@
             </a:r>
           </a:p>
           <a:p>
-            <a:pPr marL="742950" lvl="1" indent="-285750" algn="ctr">
+            <a:pPr marL="742950" lvl="1" indent="-285750">
+              <a:lnSpc>
+                <a:spcPct val="110000"/>
+              </a:lnSpc>
               <a:buFont typeface="Arial" panose="020B0604020202020204" pitchFamily="34" charset="0"/>
               <a:buChar char="•"/>
             </a:pPr>
             <a:r>
-              <a:rPr lang="fr-FR" b="0" i="0" dirty="0">
+              <a:rPr lang="fr-FR" sz="1400" b="0" i="0">
                 <a:effectLst/>
                 <a:latin typeface="Söhne"/>
               </a:rPr>
@@ -5145,10 +5219,419 @@
             </a:r>
           </a:p>
           <a:p>
-            <a:endParaRPr lang="fr-FR" dirty="0"/>
-          </a:p>
-        </p:txBody>
-      </p:sp>
+            <a:pPr>
+              <a:lnSpc>
+                <a:spcPct val="110000"/>
+              </a:lnSpc>
+            </a:pPr>
+            <a:endParaRPr lang="fr-FR" sz="1400"/>
+          </a:p>
+        </p:txBody>
+      </p:sp>
+      <p:sp>
+        <p:nvSpPr>
+          <p:cNvPr id="14" name="Freeform: Shape 13">
+            <a:extLst>
+              <a:ext uri="{FF2B5EF4-FFF2-40B4-BE49-F238E27FC236}">
+                <a16:creationId xmlns:a16="http://schemas.microsoft.com/office/drawing/2014/main" id="{B61752EE-2019-48E4-B891-13C83EDC0B87}"/>
+              </a:ext>
+              <a:ext uri="{C183D7F6-B498-43B3-948B-1728B52AA6E4}">
+                <adec:decorative xmlns:adec="http://schemas.microsoft.com/office/drawing/2017/decorative" val="1"/>
+              </a:ext>
+            </a:extLst>
+          </p:cNvPr>
+          <p:cNvSpPr>
+            <a:spLocks noGrp="1" noRot="1" noChangeAspect="1" noMove="1" noResize="1" noEditPoints="1" noAdjustHandles="1" noChangeArrowheads="1" noChangeShapeType="1" noTextEdit="1"/>
+          </p:cNvSpPr>
+          <p:nvPr>
+            <p:extLst>
+              <p:ext uri="{386F3935-93C4-4BCD-93E2-E3B085C9AB24}">
+                <p16:designElem xmlns:p16="http://schemas.microsoft.com/office/powerpoint/2015/main" val="1"/>
+              </p:ext>
+            </p:extLst>
+          </p:nvPr>
+        </p:nvSpPr>
+        <p:spPr>
+          <a:xfrm rot="5400000" flipH="1">
+            <a:off x="5253435" y="-25387"/>
+            <a:ext cx="3426280" cy="3477937"/>
+          </a:xfrm>
+          <a:custGeom>
+            <a:avLst/>
+            <a:gdLst>
+              <a:gd name="connsiteX0" fmla="*/ 3388058 w 3388208"/>
+              <a:gd name="connsiteY0" fmla="*/ 0 h 3406341"/>
+              <a:gd name="connsiteX1" fmla="*/ 3388208 w 3388208"/>
+              <a:gd name="connsiteY1" fmla="*/ 0 h 3406341"/>
+              <a:gd name="connsiteX2" fmla="*/ 3388208 w 3388208"/>
+              <a:gd name="connsiteY2" fmla="*/ 3406341 h 3406341"/>
+              <a:gd name="connsiteX3" fmla="*/ 0 w 3388208"/>
+              <a:gd name="connsiteY3" fmla="*/ 3406341 h 3406341"/>
+              <a:gd name="connsiteX4" fmla="*/ 79006 w 3388208"/>
+              <a:gd name="connsiteY4" fmla="*/ 3404386 h 3406341"/>
+              <a:gd name="connsiteX5" fmla="*/ 3383947 w 3388208"/>
+              <a:gd name="connsiteY5" fmla="*/ 164274 h 3406341"/>
+            </a:gdLst>
+            <a:ahLst/>
+            <a:cxnLst>
+              <a:cxn ang="0">
+                <a:pos x="connsiteX0" y="connsiteY0"/>
+              </a:cxn>
+              <a:cxn ang="0">
+                <a:pos x="connsiteX1" y="connsiteY1"/>
+              </a:cxn>
+              <a:cxn ang="0">
+                <a:pos x="connsiteX2" y="connsiteY2"/>
+              </a:cxn>
+              <a:cxn ang="0">
+                <a:pos x="connsiteX3" y="connsiteY3"/>
+              </a:cxn>
+              <a:cxn ang="0">
+                <a:pos x="connsiteX4" y="connsiteY4"/>
+              </a:cxn>
+              <a:cxn ang="0">
+                <a:pos x="connsiteX5" y="connsiteY5"/>
+              </a:cxn>
+            </a:cxnLst>
+            <a:rect l="l" t="t" r="r" b="b"/>
+            <a:pathLst>
+              <a:path w="3388208" h="3406341">
+                <a:moveTo>
+                  <a:pt x="3388058" y="0"/>
+                </a:moveTo>
+                <a:lnTo>
+                  <a:pt x="3388208" y="0"/>
+                </a:lnTo>
+                <a:lnTo>
+                  <a:pt x="3388208" y="3406341"/>
+                </a:lnTo>
+                <a:lnTo>
+                  <a:pt x="0" y="3406341"/>
+                </a:lnTo>
+                <a:lnTo>
+                  <a:pt x="79006" y="3404386"/>
+                </a:lnTo>
+                <a:cubicBezTo>
+                  <a:pt x="1864742" y="3315784"/>
+                  <a:pt x="3296223" y="1912901"/>
+                  <a:pt x="3383947" y="164274"/>
+                </a:cubicBezTo>
+                <a:close/>
+              </a:path>
+            </a:pathLst>
+          </a:custGeom>
+          <a:solidFill>
+            <a:schemeClr val="accent4">
+              <a:lumMod val="40000"/>
+              <a:lumOff val="60000"/>
+            </a:schemeClr>
+          </a:solidFill>
+          <a:ln>
+            <a:noFill/>
+          </a:ln>
+        </p:spPr>
+        <p:style>
+          <a:lnRef idx="2">
+            <a:schemeClr val="accent1">
+              <a:shade val="50000"/>
+            </a:schemeClr>
+          </a:lnRef>
+          <a:fillRef idx="1">
+            <a:schemeClr val="accent1"/>
+          </a:fillRef>
+          <a:effectRef idx="0">
+            <a:schemeClr val="accent1"/>
+          </a:effectRef>
+          <a:fontRef idx="minor">
+            <a:schemeClr val="lt1"/>
+          </a:fontRef>
+        </p:style>
+        <p:txBody>
+          <a:bodyPr wrap="square" rtlCol="0" anchor="ctr">
+            <a:noAutofit/>
+          </a:bodyPr>
+          <a:lstStyle/>
+          <a:p>
+            <a:pPr algn="ctr"/>
+            <a:endParaRPr lang="en-US"/>
+          </a:p>
+        </p:txBody>
+      </p:sp>
+      <p:sp>
+        <p:nvSpPr>
+          <p:cNvPr id="16" name="Rectangle 15">
+            <a:extLst>
+              <a:ext uri="{FF2B5EF4-FFF2-40B4-BE49-F238E27FC236}">
+                <a16:creationId xmlns:a16="http://schemas.microsoft.com/office/drawing/2014/main" id="{107D3F89-C58A-45F7-8E26-2B6B48112FB7}"/>
+              </a:ext>
+              <a:ext uri="{C183D7F6-B498-43B3-948B-1728B52AA6E4}">
+                <adec:decorative xmlns:adec="http://schemas.microsoft.com/office/drawing/2017/decorative" val="1"/>
+              </a:ext>
+            </a:extLst>
+          </p:cNvPr>
+          <p:cNvSpPr>
+            <a:spLocks noGrp="1" noRot="1" noChangeAspect="1" noMove="1" noResize="1" noEditPoints="1" noAdjustHandles="1" noChangeArrowheads="1" noChangeShapeType="1" noTextEdit="1"/>
+          </p:cNvSpPr>
+          <p:nvPr>
+            <p:extLst>
+              <p:ext uri="{386F3935-93C4-4BCD-93E2-E3B085C9AB24}">
+                <p16:designElem xmlns:p16="http://schemas.microsoft.com/office/powerpoint/2015/main" val="1"/>
+              </p:ext>
+            </p:extLst>
+          </p:nvPr>
+        </p:nvSpPr>
+        <p:spPr>
+          <a:xfrm rot="16200000" flipH="1">
+            <a:off x="8735837" y="3400142"/>
+            <a:ext cx="3429000" cy="3484819"/>
+          </a:xfrm>
+          <a:prstGeom prst="rect">
+            <a:avLst/>
+          </a:prstGeom>
+          <a:solidFill>
+            <a:schemeClr val="accent5"/>
+          </a:solidFill>
+          <a:ln>
+            <a:noFill/>
+          </a:ln>
+        </p:spPr>
+        <p:style>
+          <a:lnRef idx="2">
+            <a:schemeClr val="accent1">
+              <a:shade val="50000"/>
+            </a:schemeClr>
+          </a:lnRef>
+          <a:fillRef idx="1">
+            <a:schemeClr val="accent1"/>
+          </a:fillRef>
+          <a:effectRef idx="0">
+            <a:schemeClr val="accent1"/>
+          </a:effectRef>
+          <a:fontRef idx="minor">
+            <a:schemeClr val="lt1"/>
+          </a:fontRef>
+        </p:style>
+        <p:txBody>
+          <a:bodyPr rtlCol="0" anchor="ctr"/>
+          <a:lstStyle/>
+          <a:p>
+            <a:pPr algn="ctr"/>
+            <a:endParaRPr lang="en-US" dirty="0"/>
+          </a:p>
+        </p:txBody>
+      </p:sp>
+      <p:sp>
+        <p:nvSpPr>
+          <p:cNvPr id="18" name="Rectangle 17">
+            <a:extLst>
+              <a:ext uri="{FF2B5EF4-FFF2-40B4-BE49-F238E27FC236}">
+                <a16:creationId xmlns:a16="http://schemas.microsoft.com/office/drawing/2014/main" id="{5C542152-E969-4F41-AFD8-4B5354BE54C9}"/>
+              </a:ext>
+              <a:ext uri="{C183D7F6-B498-43B3-948B-1728B52AA6E4}">
+                <adec:decorative xmlns:adec="http://schemas.microsoft.com/office/drawing/2017/decorative" val="1"/>
+              </a:ext>
+            </a:extLst>
+          </p:cNvPr>
+          <p:cNvSpPr>
+            <a:spLocks noGrp="1" noRot="1" noChangeAspect="1" noMove="1" noResize="1" noEditPoints="1" noAdjustHandles="1" noChangeArrowheads="1" noChangeShapeType="1" noTextEdit="1"/>
+          </p:cNvSpPr>
+          <p:nvPr>
+            <p:extLst>
+              <p:ext uri="{386F3935-93C4-4BCD-93E2-E3B085C9AB24}">
+                <p16:designElem xmlns:p16="http://schemas.microsoft.com/office/powerpoint/2015/main" val="1"/>
+              </p:ext>
+            </p:extLst>
+          </p:nvPr>
+        </p:nvSpPr>
+        <p:spPr>
+          <a:xfrm rot="16200000" flipH="1">
+            <a:off x="5255042" y="3400619"/>
+            <a:ext cx="3429945" cy="3484818"/>
+          </a:xfrm>
+          <a:prstGeom prst="rect">
+            <a:avLst/>
+          </a:prstGeom>
+          <a:solidFill>
+            <a:schemeClr val="accent1">
+              <a:lumMod val="60000"/>
+              <a:lumOff val="40000"/>
+            </a:schemeClr>
+          </a:solidFill>
+          <a:ln>
+            <a:noFill/>
+          </a:ln>
+        </p:spPr>
+        <p:style>
+          <a:lnRef idx="2">
+            <a:schemeClr val="accent1">
+              <a:shade val="50000"/>
+            </a:schemeClr>
+          </a:lnRef>
+          <a:fillRef idx="1">
+            <a:schemeClr val="accent1"/>
+          </a:fillRef>
+          <a:effectRef idx="0">
+            <a:schemeClr val="accent1"/>
+          </a:effectRef>
+          <a:fontRef idx="minor">
+            <a:schemeClr val="lt1"/>
+          </a:fontRef>
+        </p:style>
+        <p:txBody>
+          <a:bodyPr rtlCol="0" anchor="ctr"/>
+          <a:lstStyle/>
+          <a:p>
+            <a:pPr algn="ctr"/>
+            <a:endParaRPr lang="en-US" dirty="0"/>
+          </a:p>
+        </p:txBody>
+      </p:sp>
+      <p:sp>
+        <p:nvSpPr>
+          <p:cNvPr id="20" name="Rectangle 34">
+            <a:extLst>
+              <a:ext uri="{FF2B5EF4-FFF2-40B4-BE49-F238E27FC236}">
+                <a16:creationId xmlns:a16="http://schemas.microsoft.com/office/drawing/2014/main" id="{C2EDDE5C-FB26-46E8-9F4C-3548CC15C2C7}"/>
+              </a:ext>
+              <a:ext uri="{C183D7F6-B498-43B3-948B-1728B52AA6E4}">
+                <adec:decorative xmlns:adec="http://schemas.microsoft.com/office/drawing/2017/decorative" val="1"/>
+              </a:ext>
+            </a:extLst>
+          </p:cNvPr>
+          <p:cNvSpPr>
+            <a:spLocks noGrp="1" noRot="1" noChangeAspect="1" noMove="1" noResize="1" noEditPoints="1" noAdjustHandles="1" noChangeArrowheads="1" noChangeShapeType="1" noTextEdit="1"/>
+          </p:cNvSpPr>
+          <p:nvPr>
+            <p:extLst>
+              <p:ext uri="{386F3935-93C4-4BCD-93E2-E3B085C9AB24}">
+                <p16:designElem xmlns:p16="http://schemas.microsoft.com/office/powerpoint/2015/main" val="1"/>
+              </p:ext>
+            </p:extLst>
+          </p:nvPr>
+        </p:nvSpPr>
+        <p:spPr>
+          <a:xfrm rot="5400000" flipH="1">
+            <a:off x="8735091" y="3401091"/>
+            <a:ext cx="3428999" cy="3484818"/>
+          </a:xfrm>
+          <a:custGeom>
+            <a:avLst/>
+            <a:gdLst>
+              <a:gd name="connsiteX0" fmla="*/ 0 w 3484819"/>
+              <a:gd name="connsiteY0" fmla="*/ 0 h 3430264"/>
+              <a:gd name="connsiteX1" fmla="*/ 3484819 w 3484819"/>
+              <a:gd name="connsiteY1" fmla="*/ 0 h 3430264"/>
+              <a:gd name="connsiteX2" fmla="*/ 3484819 w 3484819"/>
+              <a:gd name="connsiteY2" fmla="*/ 3430264 h 3430264"/>
+              <a:gd name="connsiteX3" fmla="*/ 0 w 3484819"/>
+              <a:gd name="connsiteY3" fmla="*/ 3430264 h 3430264"/>
+              <a:gd name="connsiteX4" fmla="*/ 0 w 3484819"/>
+              <a:gd name="connsiteY4" fmla="*/ 0 h 3430264"/>
+              <a:gd name="connsiteX0" fmla="*/ 0 w 3484819"/>
+              <a:gd name="connsiteY0" fmla="*/ 0 h 3430264"/>
+              <a:gd name="connsiteX1" fmla="*/ 3484819 w 3484819"/>
+              <a:gd name="connsiteY1" fmla="*/ 0 h 3430264"/>
+              <a:gd name="connsiteX2" fmla="*/ 0 w 3484819"/>
+              <a:gd name="connsiteY2" fmla="*/ 3430264 h 3430264"/>
+              <a:gd name="connsiteX3" fmla="*/ 0 w 3484819"/>
+              <a:gd name="connsiteY3" fmla="*/ 0 h 3430264"/>
+            </a:gdLst>
+            <a:ahLst/>
+            <a:cxnLst>
+              <a:cxn ang="0">
+                <a:pos x="connsiteX0" y="connsiteY0"/>
+              </a:cxn>
+              <a:cxn ang="0">
+                <a:pos x="connsiteX1" y="connsiteY1"/>
+              </a:cxn>
+              <a:cxn ang="0">
+                <a:pos x="connsiteX2" y="connsiteY2"/>
+              </a:cxn>
+              <a:cxn ang="0">
+                <a:pos x="connsiteX3" y="connsiteY3"/>
+              </a:cxn>
+            </a:cxnLst>
+            <a:rect l="l" t="t" r="r" b="b"/>
+            <a:pathLst>
+              <a:path w="3484819" h="3430264">
+                <a:moveTo>
+                  <a:pt x="0" y="0"/>
+                </a:moveTo>
+                <a:lnTo>
+                  <a:pt x="3484819" y="0"/>
+                </a:lnTo>
+                <a:lnTo>
+                  <a:pt x="0" y="3430264"/>
+                </a:lnTo>
+                <a:lnTo>
+                  <a:pt x="0" y="0"/>
+                </a:lnTo>
+                <a:close/>
+              </a:path>
+            </a:pathLst>
+          </a:custGeom>
+          <a:solidFill>
+            <a:schemeClr val="tx2"/>
+          </a:solidFill>
+          <a:ln>
+            <a:noFill/>
+          </a:ln>
+        </p:spPr>
+        <p:style>
+          <a:lnRef idx="2">
+            <a:schemeClr val="accent1">
+              <a:shade val="50000"/>
+            </a:schemeClr>
+          </a:lnRef>
+          <a:fillRef idx="1">
+            <a:schemeClr val="accent1"/>
+          </a:fillRef>
+          <a:effectRef idx="0">
+            <a:schemeClr val="accent1"/>
+          </a:effectRef>
+          <a:fontRef idx="minor">
+            <a:schemeClr val="lt1"/>
+          </a:fontRef>
+        </p:style>
+        <p:txBody>
+          <a:bodyPr rtlCol="0" anchor="ctr"/>
+          <a:lstStyle/>
+          <a:p>
+            <a:pPr algn="ctr"/>
+            <a:endParaRPr lang="en-US" dirty="0"/>
+          </a:p>
+        </p:txBody>
+      </p:sp>
+      <p:pic>
+        <p:nvPicPr>
+          <p:cNvPr id="9" name="Image 8" descr="Une image contenant Graphique, capture d’écran, graphisme, cercle&#10;&#10;Description générée automatiquement">
+            <a:extLst>
+              <a:ext uri="{FF2B5EF4-FFF2-40B4-BE49-F238E27FC236}">
+                <a16:creationId xmlns:a16="http://schemas.microsoft.com/office/drawing/2014/main" id="{EEBF17D6-2934-D21E-EDC5-4ABE0518A59A}"/>
+              </a:ext>
+            </a:extLst>
+          </p:cNvPr>
+          <p:cNvPicPr>
+            <a:picLocks noChangeAspect="1"/>
+          </p:cNvPicPr>
+          <p:nvPr/>
+        </p:nvPicPr>
+        <p:blipFill>
+          <a:blip r:embed="rId2"/>
+          <a:stretch>
+            <a:fillRect/>
+          </a:stretch>
+        </p:blipFill>
+        <p:spPr>
+          <a:xfrm>
+            <a:off x="6096000" y="527971"/>
+            <a:ext cx="6096000" cy="2551043"/>
+          </a:xfrm>
+          <a:prstGeom prst="rect">
+            <a:avLst/>
+          </a:prstGeom>
+        </p:spPr>
+      </p:pic>
     </p:spTree>
     <p:extLst>
       <p:ext uri="{BB962C8B-B14F-4D97-AF65-F5344CB8AC3E}">
@@ -5242,12 +5725,14 @@
         </p:nvSpPr>
         <p:spPr>
           <a:xfrm>
-            <a:off x="1077361" y="1942407"/>
-            <a:ext cx="9950103" cy="3513514"/>
+            <a:off x="1077361" y="2227809"/>
+            <a:ext cx="9950103" cy="4630190"/>
           </a:xfrm>
         </p:spPr>
         <p:txBody>
-          <a:bodyPr/>
+          <a:bodyPr>
+            <a:normAutofit/>
+          </a:bodyPr>
           <a:lstStyle/>
           <a:p>
             <a:pPr marL="0" indent="0" algn="ctr">
@@ -5270,7 +5755,7 @@
                 <a:effectLst/>
                 <a:latin typeface="Söhne"/>
               </a:rPr>
-              <a:t> Faciliter les transactions de cryptomonnaies pour tous.</a:t>
+              <a:t> « Faciliter les transactions de cryptomonnaies pour tous. »</a:t>
             </a:r>
           </a:p>
           <a:p>
@@ -5304,6 +5789,13 @@
               </a:rPr>
               <a:t>Laravel</a:t>
             </a:r>
+            <a:r>
+              <a:rPr lang="fr-FR" b="0" i="0" dirty="0">
+                <a:effectLst/>
+                <a:latin typeface="Söhne"/>
+              </a:rPr>
+              <a:t> API / MySQL / PHP</a:t>
+            </a:r>
             <a:endParaRPr lang="fr-FR" dirty="0">
               <a:latin typeface="Söhne"/>
             </a:endParaRPr>
@@ -5330,6 +5822,69 @@
                 <a:latin typeface="Söhne"/>
               </a:rPr>
               <a:t>React</a:t>
+            </a:r>
+            <a:r>
+              <a:rPr lang="fr-FR" b="0" i="0" dirty="0">
+                <a:effectLst/>
+                <a:latin typeface="Söhne"/>
+              </a:rPr>
+              <a:t> / Axios / Router-dom </a:t>
+            </a:r>
+          </a:p>
+          <a:p>
+            <a:pPr algn="ctr"/>
+            <a:r>
+              <a:rPr lang="fr-FR" b="0" i="0" dirty="0">
+                <a:effectLst/>
+                <a:latin typeface="Söhne"/>
+              </a:rPr>
+              <a:t>Design: Bootstrap/</a:t>
+            </a:r>
+            <a:r>
+              <a:rPr lang="fr-FR" b="0" i="0" dirty="0" err="1">
+                <a:effectLst/>
+                <a:latin typeface="Söhne"/>
+              </a:rPr>
+              <a:t>React-bootstrap</a:t>
+            </a:r>
+            <a:endParaRPr lang="fr-FR" dirty="0">
+              <a:latin typeface="Söhne"/>
+            </a:endParaRPr>
+          </a:p>
+          <a:p>
+            <a:pPr algn="ctr"/>
+            <a:r>
+              <a:rPr lang="fr-FR" dirty="0" err="1">
+                <a:latin typeface="Söhne"/>
+              </a:rPr>
+              <a:t>React</a:t>
+            </a:r>
+            <a:r>
+              <a:rPr lang="fr-FR" dirty="0">
+                <a:latin typeface="Söhne"/>
+              </a:rPr>
+              <a:t>-select / </a:t>
+            </a:r>
+            <a:r>
+              <a:rPr lang="fr-FR" b="0" i="0" dirty="0" err="1">
+                <a:effectLst/>
+                <a:latin typeface="Söhne"/>
+              </a:rPr>
+              <a:t>React</a:t>
+            </a:r>
+            <a:r>
+              <a:rPr lang="fr-FR" b="0" i="0" dirty="0">
+                <a:effectLst/>
+                <a:latin typeface="Söhne"/>
+              </a:rPr>
+              <a:t>-modal / </a:t>
+            </a:r>
+            <a:r>
+              <a:rPr lang="fr-FR" b="0" i="0" dirty="0" err="1">
+                <a:effectLst/>
+                <a:latin typeface="Söhne"/>
+              </a:rPr>
+              <a:t>React-apexcharts</a:t>
             </a:r>
             <a:endParaRPr lang="fr-FR" b="0" i="0" dirty="0">
               <a:effectLst/>
@@ -5337,20 +5892,100 @@
             </a:endParaRPr>
           </a:p>
           <a:p>
-            <a:pPr algn="ctr"/>
-            <a:r>
-              <a:rPr lang="fr-FR" b="0" i="0" dirty="0">
-                <a:effectLst/>
-                <a:latin typeface="Söhne"/>
-              </a:rPr>
-              <a:t>API externes: [Mentionner lesquelles si utilisées]</a:t>
-            </a:r>
-          </a:p>
-          <a:p>
             <a:endParaRPr lang="fr-FR" dirty="0"/>
           </a:p>
         </p:txBody>
       </p:sp>
+      <p:pic>
+        <p:nvPicPr>
+          <p:cNvPr id="5" name="Image 4" descr="Une image contenant conception, Graphique, Police, capture d’écran&#10;&#10;Description générée automatiquement">
+            <a:extLst>
+              <a:ext uri="{FF2B5EF4-FFF2-40B4-BE49-F238E27FC236}">
+                <a16:creationId xmlns:a16="http://schemas.microsoft.com/office/drawing/2014/main" id="{A0843E79-85F3-F077-F266-9EC9F6CA28BB}"/>
+              </a:ext>
+            </a:extLst>
+          </p:cNvPr>
+          <p:cNvPicPr>
+            <a:picLocks noChangeAspect="1"/>
+          </p:cNvPicPr>
+          <p:nvPr/>
+        </p:nvPicPr>
+        <p:blipFill>
+          <a:blip r:embed="rId2"/>
+          <a:stretch>
+            <a:fillRect/>
+          </a:stretch>
+        </p:blipFill>
+        <p:spPr>
+          <a:xfrm>
+            <a:off x="0" y="4630191"/>
+            <a:ext cx="3763818" cy="3449780"/>
+          </a:xfrm>
+          <a:prstGeom prst="rect">
+            <a:avLst/>
+          </a:prstGeom>
+        </p:spPr>
+      </p:pic>
+      <p:pic>
+        <p:nvPicPr>
+          <p:cNvPr id="7" name="Image 6" descr="Une image contenant Graphique, clipart, symbole, cercle&#10;&#10;Description générée automatiquement">
+            <a:extLst>
+              <a:ext uri="{FF2B5EF4-FFF2-40B4-BE49-F238E27FC236}">
+                <a16:creationId xmlns:a16="http://schemas.microsoft.com/office/drawing/2014/main" id="{7BEB7521-C5E6-7F7D-D575-931FBAFE4BD1}"/>
+              </a:ext>
+            </a:extLst>
+          </p:cNvPr>
+          <p:cNvPicPr>
+            <a:picLocks noChangeAspect="1"/>
+          </p:cNvPicPr>
+          <p:nvPr/>
+        </p:nvPicPr>
+        <p:blipFill>
+          <a:blip r:embed="rId3"/>
+          <a:stretch>
+            <a:fillRect/>
+          </a:stretch>
+        </p:blipFill>
+        <p:spPr>
+          <a:xfrm>
+            <a:off x="10896301" y="0"/>
+            <a:ext cx="1295699" cy="1163922"/>
+          </a:xfrm>
+          <a:prstGeom prst="rect">
+            <a:avLst/>
+          </a:prstGeom>
+        </p:spPr>
+      </p:pic>
+      <p:pic>
+        <p:nvPicPr>
+          <p:cNvPr id="11" name="Image 10" descr="Une image contenant Graphique, logo, graphisme, symbole&#10;&#10;Description générée automatiquement">
+            <a:extLst>
+              <a:ext uri="{FF2B5EF4-FFF2-40B4-BE49-F238E27FC236}">
+                <a16:creationId xmlns:a16="http://schemas.microsoft.com/office/drawing/2014/main" id="{B606BF41-3EDF-E108-EAF0-DB879CA1EB63}"/>
+              </a:ext>
+            </a:extLst>
+          </p:cNvPr>
+          <p:cNvPicPr>
+            <a:picLocks noChangeAspect="1"/>
+          </p:cNvPicPr>
+          <p:nvPr/>
+        </p:nvPicPr>
+        <p:blipFill>
+          <a:blip r:embed="rId4"/>
+          <a:stretch>
+            <a:fillRect/>
+          </a:stretch>
+        </p:blipFill>
+        <p:spPr>
+          <a:xfrm>
+            <a:off x="1" y="1"/>
+            <a:ext cx="1330036" cy="1330036"/>
+          </a:xfrm>
+          <a:prstGeom prst="rect">
+            <a:avLst/>
+          </a:prstGeom>
+        </p:spPr>
+      </p:pic>
     </p:spTree>
     <p:extLst>
       <p:ext uri="{BB962C8B-B14F-4D97-AF65-F5344CB8AC3E}">
@@ -5397,9 +6032,16 @@
             <p:ph type="title"/>
           </p:nvPr>
         </p:nvSpPr>
-        <p:spPr/>
-        <p:txBody>
-          <a:bodyPr/>
+        <p:spPr>
+          <a:xfrm>
+            <a:off x="1077362" y="0"/>
+            <a:ext cx="9950103" cy="1507376"/>
+          </a:xfrm>
+        </p:spPr>
+        <p:txBody>
+          <a:bodyPr>
+            <a:normAutofit fontScale="90000"/>
+          </a:bodyPr>
           <a:lstStyle/>
           <a:p>
             <a:pPr algn="ctr"/>
@@ -5416,151 +6058,45 @@
                 <a:latin typeface="Söhne"/>
               </a:rPr>
             </a:br>
+            <a:br>
+              <a:rPr lang="fr-FR" b="1" i="0" dirty="0">
+                <a:effectLst/>
+                <a:latin typeface="Söhne"/>
+              </a:rPr>
+            </a:br>
             <a:endParaRPr lang="fr-FR" dirty="0"/>
           </a:p>
         </p:txBody>
       </p:sp>
-      <p:sp>
-        <p:nvSpPr>
-          <p:cNvPr id="3" name="Espace réservé du contenu 2">
-            <a:extLst>
-              <a:ext uri="{FF2B5EF4-FFF2-40B4-BE49-F238E27FC236}">
-                <a16:creationId xmlns:a16="http://schemas.microsoft.com/office/drawing/2014/main" id="{E5A569A6-3417-75A7-7272-267057F40145}"/>
-              </a:ext>
-            </a:extLst>
-          </p:cNvPr>
-          <p:cNvSpPr>
-            <a:spLocks noGrp="1"/>
-          </p:cNvSpPr>
+      <p:pic>
+        <p:nvPicPr>
+          <p:cNvPr id="5" name="Espace réservé du contenu 4" descr="Une image contenant capture d’écran, Logiciel de graphisme, Logiciel multimédia, Modélisation 3D&#10;&#10;Description générée automatiquement">
+            <a:extLst>
+              <a:ext uri="{FF2B5EF4-FFF2-40B4-BE49-F238E27FC236}">
+                <a16:creationId xmlns:a16="http://schemas.microsoft.com/office/drawing/2014/main" id="{5DC13F52-05D0-4DD7-006C-14BE6B88C3F6}"/>
+              </a:ext>
+            </a:extLst>
+          </p:cNvPr>
+          <p:cNvPicPr>
+            <a:picLocks noGrp="1" noChangeAspect="1"/>
+          </p:cNvPicPr>
           <p:nvPr>
             <p:ph idx="1"/>
           </p:nvPr>
-        </p:nvSpPr>
+        </p:nvPicPr>
+        <p:blipFill>
+          <a:blip r:embed="rId2"/>
+          <a:stretch>
+            <a:fillRect/>
+          </a:stretch>
+        </p:blipFill>
         <p:spPr>
           <a:xfrm>
-            <a:off x="1077362" y="1898073"/>
-            <a:ext cx="9950103" cy="4042757"/>
+            <a:off x="1163620" y="845128"/>
+            <a:ext cx="9863846" cy="5122474"/>
           </a:xfrm>
         </p:spPr>
-        <p:txBody>
-          <a:bodyPr/>
-          <a:lstStyle/>
-          <a:p>
-            <a:pPr marL="0" indent="0" algn="ctr">
-              <a:buNone/>
-            </a:pPr>
-            <a:r>
-              <a:rPr lang="fr-FR" sz="2400" b="1" i="0" dirty="0">
-                <a:effectLst/>
-                <a:latin typeface="Söhne"/>
-              </a:rPr>
-              <a:t>Tables principales:</a:t>
-            </a:r>
-          </a:p>
-          <a:p>
-            <a:pPr marL="0" indent="0" algn="ctr">
-              <a:buNone/>
-            </a:pPr>
-            <a:endParaRPr lang="fr-FR" sz="2400" b="1" i="0" dirty="0">
-              <a:effectLst/>
-              <a:latin typeface="Söhne"/>
-            </a:endParaRPr>
-          </a:p>
-          <a:p>
-            <a:pPr algn="ctr">
-              <a:buFont typeface="Arial" panose="020B0604020202020204" pitchFamily="34" charset="0"/>
-              <a:buChar char="•"/>
-            </a:pPr>
-            <a:r>
-              <a:rPr lang="fr-FR" b="0" i="0" dirty="0">
-                <a:effectLst/>
-                <a:latin typeface="Söhne"/>
-              </a:rPr>
-              <a:t>Utilisateurs (Admins &amp; Clients)</a:t>
-            </a:r>
-          </a:p>
-          <a:p>
-            <a:pPr algn="ctr">
-              <a:buFont typeface="Arial" panose="020B0604020202020204" pitchFamily="34" charset="0"/>
-              <a:buChar char="•"/>
-            </a:pPr>
-            <a:r>
-              <a:rPr lang="fr-FR" b="0" i="0" dirty="0">
-                <a:effectLst/>
-                <a:latin typeface="Söhne"/>
-              </a:rPr>
-              <a:t>Cryptomonnaies (10 types mentionnés)</a:t>
-            </a:r>
-          </a:p>
-          <a:p>
-            <a:pPr algn="ctr">
-              <a:buFont typeface="Arial" panose="020B0604020202020204" pitchFamily="34" charset="0"/>
-              <a:buChar char="•"/>
-            </a:pPr>
-            <a:r>
-              <a:rPr lang="fr-FR" dirty="0">
-                <a:latin typeface="Söhne"/>
-              </a:rPr>
-              <a:t>Prix des Cryptomonnaies</a:t>
-            </a:r>
-            <a:endParaRPr lang="fr-FR" b="0" i="0" dirty="0">
-              <a:effectLst/>
-              <a:latin typeface="Söhne"/>
-            </a:endParaRPr>
-          </a:p>
-          <a:p>
-            <a:pPr algn="ctr">
-              <a:buFont typeface="Arial" panose="020B0604020202020204" pitchFamily="34" charset="0"/>
-              <a:buChar char="•"/>
-            </a:pPr>
-            <a:r>
-              <a:rPr lang="fr-FR" b="0" i="0" dirty="0">
-                <a:effectLst/>
-                <a:latin typeface="Söhne"/>
-              </a:rPr>
-              <a:t>Portefeuille</a:t>
-            </a:r>
-          </a:p>
-          <a:p>
-            <a:pPr algn="ctr">
-              <a:buFont typeface="Arial" panose="020B0604020202020204" pitchFamily="34" charset="0"/>
-              <a:buChar char="•"/>
-            </a:pPr>
-            <a:r>
-              <a:rPr lang="fr-FR" b="0" i="0" dirty="0">
-                <a:effectLst/>
-                <a:latin typeface="Söhne"/>
-              </a:rPr>
-              <a:t>Transactions</a:t>
-            </a:r>
-          </a:p>
-          <a:p>
-            <a:pPr algn="ctr">
-              <a:buFont typeface="Arial" panose="020B0604020202020204" pitchFamily="34" charset="0"/>
-              <a:buChar char="•"/>
-            </a:pPr>
-            <a:r>
-              <a:rPr lang="fr-FR" dirty="0" err="1">
-                <a:latin typeface="Söhne"/>
-              </a:rPr>
-              <a:t>Wallet</a:t>
-            </a:r>
-            <a:r>
-              <a:rPr lang="fr-FR" dirty="0">
-                <a:latin typeface="Söhne"/>
-              </a:rPr>
-              <a:t> pour les cryptomonnaies</a:t>
-            </a:r>
-            <a:endParaRPr lang="fr-FR" b="0" i="0" dirty="0">
-              <a:effectLst/>
-              <a:latin typeface="Söhne"/>
-            </a:endParaRPr>
-          </a:p>
-          <a:p>
-            <a:endParaRPr lang="fr-FR" dirty="0"/>
-          </a:p>
-        </p:txBody>
-      </p:sp>
+      </p:pic>
     </p:spTree>
     <p:extLst>
       <p:ext uri="{BB962C8B-B14F-4D97-AF65-F5344CB8AC3E}">
@@ -6416,9 +6952,16 @@
             <p:ph type="title"/>
           </p:nvPr>
         </p:nvSpPr>
-        <p:spPr/>
-        <p:txBody>
-          <a:bodyPr/>
+        <p:spPr>
+          <a:xfrm>
+            <a:off x="615891" y="0"/>
+            <a:ext cx="9950103" cy="1108364"/>
+          </a:xfrm>
+        </p:spPr>
+        <p:txBody>
+          <a:bodyPr>
+            <a:normAutofit fontScale="90000"/>
+          </a:bodyPr>
           <a:lstStyle/>
           <a:p>
             <a:pPr algn="ctr"/>
@@ -6457,8 +7000,8 @@
         </p:nvSpPr>
         <p:spPr>
           <a:xfrm>
-            <a:off x="1120948" y="1672242"/>
-            <a:ext cx="9950103" cy="5019503"/>
+            <a:off x="110836" y="678873"/>
+            <a:ext cx="10960215" cy="6179127"/>
           </a:xfrm>
         </p:spPr>
         <p:txBody>
@@ -6467,51 +7010,47 @@
           </a:bodyPr>
           <a:lstStyle/>
           <a:p>
-            <a:pPr algn="l"/>
-            <a:r>
-              <a:rPr lang="fr-FR" b="0" i="0" dirty="0">
-                <a:effectLst/>
-                <a:latin typeface="Söhne"/>
-              </a:rPr>
-              <a:t>1. </a:t>
-            </a:r>
-            <a:r>
-              <a:rPr lang="fr-FR" b="0" i="0" dirty="0" err="1">
+            <a:pPr algn="ctr"/>
+            <a:endParaRPr lang="fr-FR" b="1" i="0" dirty="0">
+              <a:effectLst/>
+              <a:latin typeface="Söhne"/>
+            </a:endParaRPr>
+          </a:p>
+          <a:p>
+            <a:pPr algn="ctr"/>
+            <a:endParaRPr lang="fr-FR" b="1" dirty="0">
+              <a:latin typeface="Söhne"/>
+            </a:endParaRPr>
+          </a:p>
+          <a:p>
+            <a:pPr algn="ctr"/>
+            <a:r>
+              <a:rPr lang="fr-FR" b="1" i="0" dirty="0" err="1">
                 <a:effectLst/>
                 <a:latin typeface="Söhne"/>
               </a:rPr>
               <a:t>Front-end</a:t>
             </a:r>
             <a:r>
-              <a:rPr lang="fr-FR" b="0" i="0" dirty="0">
+              <a:rPr lang="fr-FR" b="1" i="0" dirty="0">
                 <a:effectLst/>
                 <a:latin typeface="Söhne"/>
               </a:rPr>
               <a:t> (</a:t>
             </a:r>
             <a:r>
-              <a:rPr lang="fr-FR" b="0" i="0" dirty="0" err="1">
+              <a:rPr lang="fr-FR" b="1" i="0" dirty="0" err="1">
                 <a:effectLst/>
                 <a:latin typeface="Söhne"/>
               </a:rPr>
               <a:t>React</a:t>
             </a:r>
             <a:r>
-              <a:rPr lang="fr-FR" b="0" i="0" dirty="0">
-                <a:effectLst/>
-                <a:latin typeface="Söhne"/>
-              </a:rPr>
-              <a:t>)</a:t>
-            </a:r>
-          </a:p>
-          <a:p>
-            <a:pPr algn="l"/>
-            <a:r>
               <a:rPr lang="fr-FR" b="1" i="0" dirty="0">
                 <a:effectLst/>
                 <a:latin typeface="Söhne"/>
               </a:rPr>
-              <a:t>Composants Principaux :</a:t>
+              <a:t>) :</a:t>
             </a:r>
             <a:endParaRPr lang="fr-FR" b="0" i="0" dirty="0">
               <a:effectLst/>
@@ -6519,170 +7058,279 @@
             </a:endParaRPr>
           </a:p>
           <a:p>
-            <a:pPr algn="l">
+            <a:pPr algn="ctr">
               <a:buFont typeface="Arial" panose="020B0604020202020204" pitchFamily="34" charset="0"/>
               <a:buChar char="•"/>
             </a:pPr>
             <a:r>
+              <a:rPr lang="fr-FR" b="0" i="0" dirty="0">
+                <a:effectLst/>
+                <a:latin typeface="Söhne"/>
+              </a:rPr>
+              <a:t>Composants : App, </a:t>
+            </a:r>
+            <a:r>
+              <a:rPr lang="fr-FR" b="0" i="0" dirty="0" err="1">
+                <a:effectLst/>
+                <a:latin typeface="Söhne"/>
+              </a:rPr>
+              <a:t>Navbar</a:t>
+            </a:r>
+            <a:r>
+              <a:rPr lang="fr-FR" b="0" i="0" dirty="0">
+                <a:effectLst/>
+                <a:latin typeface="Söhne"/>
+              </a:rPr>
+              <a:t>, </a:t>
+            </a:r>
+            <a:r>
+              <a:rPr lang="fr-FR" b="0" i="0" dirty="0" err="1">
+                <a:effectLst/>
+                <a:latin typeface="Söhne"/>
+              </a:rPr>
+              <a:t>LoginPage</a:t>
+            </a:r>
+            <a:r>
+              <a:rPr lang="fr-FR" b="0" i="0" dirty="0">
+                <a:effectLst/>
+                <a:latin typeface="Söhne"/>
+              </a:rPr>
+              <a:t>, Dashboard, </a:t>
+            </a:r>
+            <a:r>
+              <a:rPr lang="fr-FR" b="0" i="0" dirty="0" err="1">
+                <a:effectLst/>
+                <a:latin typeface="Söhne"/>
+              </a:rPr>
+              <a:t>CryptoConsultation</a:t>
+            </a:r>
+            <a:r>
+              <a:rPr lang="fr-FR" b="0" i="0" dirty="0">
+                <a:effectLst/>
+                <a:latin typeface="Söhne"/>
+              </a:rPr>
+              <a:t>, </a:t>
+            </a:r>
+            <a:r>
+              <a:rPr lang="fr-FR" b="0" i="0" dirty="0" err="1">
+                <a:effectLst/>
+                <a:latin typeface="Söhne"/>
+              </a:rPr>
+              <a:t>Wallet</a:t>
+            </a:r>
+            <a:r>
+              <a:rPr lang="fr-FR" b="0" i="0" dirty="0">
+                <a:effectLst/>
+                <a:latin typeface="Söhne"/>
+              </a:rPr>
+              <a:t>, </a:t>
+            </a:r>
+            <a:r>
+              <a:rPr lang="fr-FR" b="0" i="0" dirty="0" err="1">
+                <a:effectLst/>
+                <a:latin typeface="Söhne"/>
+              </a:rPr>
+              <a:t>DataPersonel</a:t>
+            </a:r>
+            <a:r>
+              <a:rPr lang="fr-FR" b="0" i="0" dirty="0">
+                <a:effectLst/>
+                <a:latin typeface="Söhne"/>
+              </a:rPr>
+              <a:t>, </a:t>
+            </a:r>
+            <a:r>
+              <a:rPr lang="fr-FR" b="0" i="0" dirty="0" err="1">
+                <a:effectLst/>
+                <a:latin typeface="Söhne"/>
+              </a:rPr>
+              <a:t>ManageClients</a:t>
+            </a:r>
+            <a:r>
+              <a:rPr lang="fr-FR" b="0" i="0" dirty="0">
+                <a:effectLst/>
+                <a:latin typeface="Söhne"/>
+              </a:rPr>
+              <a:t>.</a:t>
+            </a:r>
+          </a:p>
+          <a:p>
+            <a:pPr algn="ctr"/>
+            <a:r>
+              <a:rPr lang="fr-FR" b="1" i="0" dirty="0" err="1">
+                <a:effectLst/>
+                <a:latin typeface="Söhne"/>
+              </a:rPr>
+              <a:t>Back-end</a:t>
+            </a:r>
+            <a:r>
               <a:rPr lang="fr-FR" b="1" i="0" dirty="0">
                 <a:effectLst/>
                 <a:latin typeface="Söhne"/>
               </a:rPr>
-              <a:t>App</a:t>
-            </a:r>
-            <a:r>
-              <a:rPr lang="fr-FR" b="0" i="0" dirty="0">
-                <a:effectLst/>
-                <a:latin typeface="Söhne"/>
-              </a:rPr>
-              <a:t> : Composant racine gérant la logique d'authentification, le routage et le rendu des différentes pages.</a:t>
-            </a:r>
-          </a:p>
-          <a:p>
-            <a:pPr marL="742950" lvl="1" indent="-285750" algn="l">
+              <a:t> (</a:t>
+            </a:r>
+            <a:r>
+              <a:rPr lang="fr-FR" b="1" i="0" dirty="0" err="1">
+                <a:effectLst/>
+                <a:latin typeface="Söhne"/>
+              </a:rPr>
+              <a:t>Laravel</a:t>
+            </a:r>
+            <a:r>
+              <a:rPr lang="fr-FR" b="1" i="0" dirty="0">
+                <a:effectLst/>
+                <a:latin typeface="Söhne"/>
+              </a:rPr>
+              <a:t>) :</a:t>
+            </a:r>
+            <a:endParaRPr lang="fr-FR" b="0" i="0" dirty="0">
+              <a:effectLst/>
+              <a:latin typeface="Söhne"/>
+            </a:endParaRPr>
+          </a:p>
+          <a:p>
+            <a:pPr algn="ctr">
               <a:buFont typeface="Arial" panose="020B0604020202020204" pitchFamily="34" charset="0"/>
               <a:buChar char="•"/>
             </a:pPr>
             <a:r>
-              <a:rPr lang="fr-FR" b="1" i="0" dirty="0" err="1">
-                <a:effectLst/>
-                <a:latin typeface="Söhne"/>
-              </a:rPr>
-              <a:t>Navbar</a:t>
+              <a:rPr lang="fr-FR" b="0" i="0" dirty="0" err="1">
+                <a:effectLst/>
+                <a:latin typeface="Söhne"/>
+              </a:rPr>
+              <a:t>Endpoints</a:t>
             </a:r>
             <a:r>
               <a:rPr lang="fr-FR" b="0" i="0" dirty="0">
                 <a:effectLst/>
                 <a:latin typeface="Söhne"/>
               </a:rPr>
-              <a:t> : Affiche la barre de navigation, qui varie en fonction du rôle de l'utilisateur.</a:t>
-            </a:r>
-          </a:p>
-          <a:p>
-            <a:pPr marL="742950" lvl="1" indent="-285750" algn="l">
+              <a:t> : Solde, Infos cryptomonnaies, Gestion clients, Données utilisateur.</a:t>
+            </a:r>
+          </a:p>
+          <a:p>
+            <a:pPr algn="ctr">
               <a:buFont typeface="Arial" panose="020B0604020202020204" pitchFamily="34" charset="0"/>
               <a:buChar char="•"/>
             </a:pPr>
             <a:r>
-              <a:rPr lang="fr-FR" b="1" i="0" dirty="0" err="1">
-                <a:effectLst/>
-                <a:latin typeface="Söhne"/>
-              </a:rPr>
-              <a:t>LoginPage</a:t>
-            </a:r>
-            <a:r>
               <a:rPr lang="fr-FR" b="0" i="0" dirty="0">
                 <a:effectLst/>
                 <a:latin typeface="Söhne"/>
               </a:rPr>
-              <a:t> : Permet à l'utilisateur de se connecter.</a:t>
-            </a:r>
-          </a:p>
-          <a:p>
-            <a:pPr marL="742950" lvl="1" indent="-285750" algn="l">
+              <a:t>Modèles : User, Transaction, </a:t>
+            </a:r>
+            <a:r>
+              <a:rPr lang="fr-FR" b="0" i="0" dirty="0" err="1">
+                <a:effectLst/>
+                <a:latin typeface="Söhne"/>
+              </a:rPr>
+              <a:t>Cryptocurrency</a:t>
+            </a:r>
+            <a:r>
+              <a:rPr lang="fr-FR" b="0" i="0" dirty="0">
+                <a:effectLst/>
+                <a:latin typeface="Söhne"/>
+              </a:rPr>
+              <a:t>.</a:t>
+            </a:r>
+          </a:p>
+          <a:p>
+            <a:pPr algn="ctr"/>
+            <a:r>
+              <a:rPr lang="fr-FR" b="1" i="0" dirty="0">
+                <a:effectLst/>
+                <a:latin typeface="Söhne"/>
+              </a:rPr>
+              <a:t>Flux :</a:t>
+            </a:r>
+            <a:endParaRPr lang="fr-FR" b="0" i="0" dirty="0">
+              <a:effectLst/>
+              <a:latin typeface="Söhne"/>
+            </a:endParaRPr>
+          </a:p>
+          <a:p>
+            <a:pPr algn="ctr">
               <a:buFont typeface="Arial" panose="020B0604020202020204" pitchFamily="34" charset="0"/>
               <a:buChar char="•"/>
             </a:pPr>
             <a:r>
-              <a:rPr lang="fr-FR" b="1" i="0" dirty="0">
-                <a:effectLst/>
-                <a:latin typeface="Söhne"/>
-              </a:rPr>
-              <a:t>Dashboard</a:t>
-            </a:r>
-            <a:r>
               <a:rPr lang="fr-FR" b="0" i="0" dirty="0">
                 <a:effectLst/>
                 <a:latin typeface="Söhne"/>
               </a:rPr>
-              <a:t> : Vue principale après la connexion.</a:t>
-            </a:r>
-          </a:p>
-          <a:p>
-            <a:pPr marL="742950" lvl="1" indent="-285750" algn="l">
+              <a:t>Authentification via </a:t>
+            </a:r>
+            <a:r>
+              <a:rPr lang="fr-FR" b="0" i="0" dirty="0" err="1">
+                <a:effectLst/>
+                <a:latin typeface="Söhne"/>
+              </a:rPr>
+              <a:t>React</a:t>
+            </a:r>
+            <a:r>
+              <a:rPr lang="fr-FR" b="0" i="0" dirty="0">
+                <a:effectLst/>
+                <a:latin typeface="Söhne"/>
+              </a:rPr>
+              <a:t> → API </a:t>
+            </a:r>
+            <a:r>
+              <a:rPr lang="fr-FR" b="0" i="0" dirty="0" err="1">
+                <a:effectLst/>
+                <a:latin typeface="Söhne"/>
+              </a:rPr>
+              <a:t>Laravel</a:t>
+            </a:r>
+            <a:r>
+              <a:rPr lang="fr-FR" b="0" i="0" dirty="0">
+                <a:effectLst/>
+                <a:latin typeface="Söhne"/>
+              </a:rPr>
+              <a:t>.</a:t>
+            </a:r>
+          </a:p>
+          <a:p>
+            <a:pPr algn="ctr">
               <a:buFont typeface="Arial" panose="020B0604020202020204" pitchFamily="34" charset="0"/>
               <a:buChar char="•"/>
             </a:pPr>
             <a:r>
-              <a:rPr lang="fr-FR" b="1" i="0" dirty="0" err="1">
-                <a:effectLst/>
-                <a:latin typeface="Söhne"/>
-              </a:rPr>
-              <a:t>CryptoConsultation</a:t>
-            </a:r>
-            <a:r>
               <a:rPr lang="fr-FR" b="0" i="0" dirty="0">
                 <a:effectLst/>
                 <a:latin typeface="Söhne"/>
               </a:rPr>
-              <a:t> : Vue pour consulter les cryptomonnaies.</a:t>
-            </a:r>
-          </a:p>
-          <a:p>
-            <a:pPr marL="742950" lvl="1" indent="-285750" algn="l">
-              <a:buFont typeface="Arial" panose="020B0604020202020204" pitchFamily="34" charset="0"/>
-              <a:buChar char="•"/>
-            </a:pPr>
-            <a:r>
-              <a:rPr lang="fr-FR" b="1" i="0" dirty="0" err="1">
-                <a:effectLst/>
-                <a:latin typeface="Söhne"/>
-              </a:rPr>
-              <a:t>Wallet</a:t>
+              <a:t>Récupération &amp; gestion des données via </a:t>
+            </a:r>
+            <a:r>
+              <a:rPr lang="fr-FR" b="0" i="0" dirty="0" err="1">
+                <a:effectLst/>
+                <a:latin typeface="Söhne"/>
+              </a:rPr>
+              <a:t>React</a:t>
             </a:r>
             <a:r>
               <a:rPr lang="fr-FR" b="0" i="0" dirty="0">
                 <a:effectLst/>
                 <a:latin typeface="Söhne"/>
               </a:rPr>
-              <a:t> : Gère et affiche le solde de cryptomonnaie de l'utilisateur.</a:t>
-            </a:r>
-          </a:p>
-          <a:p>
-            <a:pPr marL="742950" lvl="1" indent="-285750" algn="l">
-              <a:buFont typeface="Arial" panose="020B0604020202020204" pitchFamily="34" charset="0"/>
-              <a:buChar char="•"/>
-            </a:pPr>
-            <a:r>
-              <a:rPr lang="fr-FR" b="1" i="0" dirty="0" err="1">
-                <a:effectLst/>
-                <a:latin typeface="Söhne"/>
-              </a:rPr>
-              <a:t>DataPersonel</a:t>
+              <a:t> ↔ API </a:t>
+            </a:r>
+            <a:r>
+              <a:rPr lang="fr-FR" b="0" i="0" dirty="0" err="1">
+                <a:effectLst/>
+                <a:latin typeface="Söhne"/>
+              </a:rPr>
+              <a:t>Laravel</a:t>
             </a:r>
             <a:r>
               <a:rPr lang="fr-FR" b="0" i="0" dirty="0">
                 <a:effectLst/>
                 <a:latin typeface="Söhne"/>
               </a:rPr>
-              <a:t> : Affiche et gère les données personnelles de l'utilisateur.</a:t>
-            </a:r>
-          </a:p>
-          <a:p>
-            <a:pPr marL="742950" lvl="1" indent="-285750" algn="l">
-              <a:buFont typeface="Arial" panose="020B0604020202020204" pitchFamily="34" charset="0"/>
-              <a:buChar char="•"/>
-            </a:pPr>
-            <a:r>
-              <a:rPr lang="fr-FR" b="1" i="0" dirty="0" err="1">
-                <a:effectLst/>
-                <a:latin typeface="Söhne"/>
-              </a:rPr>
-              <a:t>ManageClients</a:t>
-            </a:r>
-            <a:r>
-              <a:rPr lang="fr-FR" b="0" i="0" dirty="0">
-                <a:effectLst/>
-                <a:latin typeface="Söhne"/>
-              </a:rPr>
-              <a:t> : (Réservé aux administrateurs) Vue pour gérer les comptes clients.</a:t>
-            </a:r>
-          </a:p>
-          <a:p>
-            <a:pPr marL="0" indent="0">
-              <a:buNone/>
-            </a:pPr>
-            <a:endParaRPr lang="fr-FR" dirty="0"/>
+              <a:t>.</a:t>
+            </a:r>
           </a:p>
         </p:txBody>
       </p:sp>
@@ -6718,10 +7366,49 @@
       </p:grpSpPr>
       <p:sp>
         <p:nvSpPr>
+          <p:cNvPr id="2" name="Titre 1">
+            <a:extLst>
+              <a:ext uri="{FF2B5EF4-FFF2-40B4-BE49-F238E27FC236}">
+                <a16:creationId xmlns:a16="http://schemas.microsoft.com/office/drawing/2014/main" id="{89E59A98-DE35-FC37-4A7F-BC9EAEA6C427}"/>
+              </a:ext>
+            </a:extLst>
+          </p:cNvPr>
+          <p:cNvSpPr>
+            <a:spLocks noGrp="1"/>
+          </p:cNvSpPr>
+          <p:nvPr>
+            <p:ph type="title"/>
+          </p:nvPr>
+        </p:nvSpPr>
+        <p:spPr/>
+        <p:txBody>
+          <a:bodyPr/>
+          <a:lstStyle/>
+          <a:p>
+            <a:pPr algn="ctr"/>
+            <a:r>
+              <a:rPr lang="fr-FR" b="1" i="0" dirty="0">
+                <a:effectLst/>
+                <a:latin typeface="Söhne"/>
+              </a:rPr>
+              <a:t>Parcours utilisateur - Administrateur</a:t>
+            </a:r>
+            <a:br>
+              <a:rPr lang="fr-FR" b="1" i="0" dirty="0">
+                <a:effectLst/>
+                <a:latin typeface="Söhne"/>
+              </a:rPr>
+            </a:br>
+            <a:endParaRPr lang="fr-FR" dirty="0"/>
+          </a:p>
+        </p:txBody>
+      </p:sp>
+      <p:sp>
+        <p:nvSpPr>
           <p:cNvPr id="3" name="Espace réservé du contenu 2">
             <a:extLst>
               <a:ext uri="{FF2B5EF4-FFF2-40B4-BE49-F238E27FC236}">
-                <a16:creationId xmlns:a16="http://schemas.microsoft.com/office/drawing/2014/main" id="{3FF38C24-847E-D02B-2574-FE7D82F52759}"/>
+                <a16:creationId xmlns:a16="http://schemas.microsoft.com/office/drawing/2014/main" id="{47231183-B936-2901-4EE9-A7AFACB4A104}"/>
               </a:ext>
             </a:extLst>
           </p:cNvPr>
@@ -6732,73 +7419,41 @@
             <p:ph idx="1"/>
           </p:nvPr>
         </p:nvSpPr>
-        <p:spPr>
-          <a:xfrm>
-            <a:off x="541081" y="152400"/>
-            <a:ext cx="9950103" cy="6553200"/>
-          </a:xfrm>
-        </p:spPr>
-        <p:txBody>
-          <a:bodyPr>
-            <a:normAutofit fontScale="92500" lnSpcReduction="20000"/>
-          </a:bodyPr>
-          <a:lstStyle/>
-          <a:p>
+        <p:spPr/>
+        <p:txBody>
+          <a:bodyPr/>
+          <a:lstStyle/>
+          <a:p>
+            <a:pPr algn="l">
+              <a:buFont typeface="Arial" panose="020B0604020202020204" pitchFamily="34" charset="0"/>
+              <a:buChar char="•"/>
+            </a:pPr>
+            <a:r>
+              <a:rPr lang="fr-FR" b="1" i="0" dirty="0">
+                <a:effectLst/>
+                <a:latin typeface="Söhne"/>
+              </a:rPr>
+              <a:t>Connexion</a:t>
+            </a:r>
             <a:r>
               <a:rPr lang="fr-FR" b="0" i="0" dirty="0">
                 <a:effectLst/>
                 <a:latin typeface="Söhne"/>
               </a:rPr>
-              <a:t>2. </a:t>
-            </a:r>
-            <a:r>
-              <a:rPr lang="fr-FR" b="0" i="0" dirty="0" err="1">
-                <a:effectLst/>
-                <a:latin typeface="Söhne"/>
-              </a:rPr>
-              <a:t>Back-end</a:t>
-            </a:r>
-            <a:r>
-              <a:rPr lang="fr-FR" b="0" i="0" dirty="0">
-                <a:effectLst/>
-                <a:latin typeface="Söhne"/>
-              </a:rPr>
-              <a:t> (</a:t>
-            </a:r>
-            <a:r>
-              <a:rPr lang="fr-FR" b="0" i="0" dirty="0" err="1">
-                <a:effectLst/>
-                <a:latin typeface="Söhne"/>
-              </a:rPr>
-              <a:t>Laravel</a:t>
-            </a:r>
-            <a:r>
-              <a:rPr lang="fr-FR" b="0" i="0" dirty="0">
-                <a:effectLst/>
-                <a:latin typeface="Söhne"/>
-              </a:rPr>
-              <a:t>)</a:t>
-            </a:r>
-            <a:endParaRPr lang="fr-FR" b="1" i="0" dirty="0">
-              <a:effectLst/>
-              <a:latin typeface="Söhne"/>
-            </a:endParaRPr>
-          </a:p>
-          <a:p>
-            <a:pPr algn="l"/>
-            <a:r>
-              <a:rPr lang="fr-FR" b="1" i="0" dirty="0" err="1">
-                <a:effectLst/>
-                <a:latin typeface="Söhne"/>
-              </a:rPr>
-              <a:t>Endpoints</a:t>
-            </a:r>
+              <a:t> via une adresse mail et un mot de passe.</a:t>
+            </a:r>
+          </a:p>
+          <a:p>
+            <a:pPr algn="l">
+              <a:buFont typeface="Arial" panose="020B0604020202020204" pitchFamily="34" charset="0"/>
+              <a:buChar char="•"/>
+            </a:pPr>
             <a:r>
               <a:rPr lang="fr-FR" b="1" i="0" dirty="0">
                 <a:effectLst/>
                 <a:latin typeface="Söhne"/>
               </a:rPr>
-              <a:t> Principaux :</a:t>
+              <a:t>Fonctionnalités:</a:t>
             </a:r>
             <a:endParaRPr lang="fr-FR" b="0" i="0" dirty="0">
               <a:effectLst/>
@@ -6806,41 +7461,20 @@
             </a:endParaRPr>
           </a:p>
           <a:p>
-            <a:pPr algn="l">
+            <a:pPr marL="742950" lvl="1" indent="-285750" algn="l">
               <a:buFont typeface="Arial" panose="020B0604020202020204" pitchFamily="34" charset="0"/>
               <a:buChar char="•"/>
             </a:pPr>
             <a:r>
-              <a:rPr lang="fr-FR" b="1" i="0" dirty="0">
-                <a:effectLst/>
-                <a:latin typeface="Söhne"/>
-              </a:rPr>
-              <a:t>/api/</a:t>
-            </a:r>
-            <a:r>
-              <a:rPr lang="fr-FR" b="1" i="0" dirty="0" err="1">
-                <a:effectLst/>
-                <a:latin typeface="Söhne"/>
-              </a:rPr>
-              <a:t>wallet</a:t>
-            </a:r>
-            <a:r>
-              <a:rPr lang="fr-FR" b="1" i="0" dirty="0">
-                <a:effectLst/>
-                <a:latin typeface="Söhne"/>
-              </a:rPr>
-              <a:t>/balance</a:t>
-            </a:r>
-            <a:r>
               <a:rPr lang="fr-FR" b="0" i="0" dirty="0">
                 <a:effectLst/>
                 <a:latin typeface="Söhne"/>
               </a:rPr>
-              <a:t> : Récupère le solde de l'utilisateur.</a:t>
-            </a:r>
-          </a:p>
-          <a:p>
-            <a:pPr algn="l">
+              <a:t>Gestion des données personnelles</a:t>
+            </a:r>
+          </a:p>
+          <a:p>
+            <a:pPr marL="742950" lvl="1" indent="-285750" algn="l">
               <a:buFont typeface="Arial" panose="020B0604020202020204" pitchFamily="34" charset="0"/>
               <a:buChar char="•"/>
             </a:pPr>
@@ -6849,315 +7483,34 @@
                 <a:effectLst/>
                 <a:latin typeface="Söhne"/>
               </a:rPr>
-              <a:t>D'autres </a:t>
-            </a:r>
-            <a:r>
-              <a:rPr lang="fr-FR" b="0" i="0" dirty="0" err="1">
-                <a:effectLst/>
-                <a:latin typeface="Söhne"/>
-              </a:rPr>
-              <a:t>endpoints</a:t>
-            </a:r>
-            <a:r>
-              <a:rPr lang="fr-FR" b="0" i="0" dirty="0">
-                <a:effectLst/>
-                <a:latin typeface="Söhne"/>
-              </a:rPr>
-              <a:t> (non spécifiés dans votre brief) pour gérer les fonctionnalités telles que l'authentification, la gestion des transactions, l'affichage des détails des cryptomonnaies, etc.</a:t>
-            </a:r>
-          </a:p>
-          <a:p>
-            <a:pPr algn="l"/>
-            <a:r>
-              <a:rPr lang="fr-FR" b="1" i="0" dirty="0">
-                <a:effectLst/>
-                <a:latin typeface="Söhne"/>
-              </a:rPr>
-              <a:t>Modèles &amp; Tables Principaux :</a:t>
-            </a:r>
-            <a:endParaRPr lang="fr-FR" b="0" i="0" dirty="0">
-              <a:effectLst/>
-              <a:latin typeface="Söhne"/>
-            </a:endParaRPr>
-          </a:p>
-          <a:p>
-            <a:pPr algn="l">
+              <a:t>Gestion des clients: création, affichage, modification, suppression</a:t>
+            </a:r>
+          </a:p>
+          <a:p>
+            <a:pPr marL="742950" lvl="1" indent="-285750" algn="l">
               <a:buFont typeface="Arial" panose="020B0604020202020204" pitchFamily="34" charset="0"/>
               <a:buChar char="•"/>
             </a:pPr>
             <a:r>
-              <a:rPr lang="fr-FR" b="1" i="0" dirty="0">
-                <a:effectLst/>
-                <a:latin typeface="Söhne"/>
-              </a:rPr>
-              <a:t>User</a:t>
-            </a:r>
-            <a:r>
               <a:rPr lang="fr-FR" b="0" i="0" dirty="0">
                 <a:effectLst/>
                 <a:latin typeface="Söhne"/>
               </a:rPr>
-              <a:t> : Stocke les informations des utilisateurs, y compris le rôle (client ou administrateur), le solde, les identifiants, etc.</a:t>
-            </a:r>
-          </a:p>
-          <a:p>
-            <a:pPr algn="l">
+              <a:t>Assignation des droits</a:t>
+            </a:r>
+          </a:p>
+          <a:p>
+            <a:pPr marL="742950" lvl="1" indent="-285750" algn="l">
               <a:buFont typeface="Arial" panose="020B0604020202020204" pitchFamily="34" charset="0"/>
               <a:buChar char="•"/>
             </a:pPr>
             <a:r>
-              <a:rPr lang="fr-FR" b="1" i="0" dirty="0">
-                <a:effectLst/>
-                <a:latin typeface="Söhne"/>
-              </a:rPr>
-              <a:t>Transaction</a:t>
-            </a:r>
-            <a:r>
               <a:rPr lang="fr-FR" b="0" i="0" dirty="0">
                 <a:effectLst/>
                 <a:latin typeface="Söhne"/>
               </a:rPr>
-              <a:t> : (Hypothétique) Stocke les transactions de cryptomonnaie.</a:t>
-            </a:r>
-          </a:p>
-          <a:p>
-            <a:pPr algn="l">
-              <a:buFont typeface="Arial" panose="020B0604020202020204" pitchFamily="34" charset="0"/>
-              <a:buChar char="•"/>
-            </a:pPr>
-            <a:r>
-              <a:rPr lang="fr-FR" b="1" i="0" dirty="0" err="1">
-                <a:effectLst/>
-                <a:latin typeface="Söhne"/>
-              </a:rPr>
-              <a:t>Cryptocurrency</a:t>
-            </a:r>
-            <a:r>
-              <a:rPr lang="fr-FR" b="0" i="0" dirty="0">
-                <a:effectLst/>
-                <a:latin typeface="Söhne"/>
-              </a:rPr>
-              <a:t> : (Hypothétique) Stocke les informations sur différentes cryptomonnaies.</a:t>
-            </a:r>
-          </a:p>
-          <a:p>
-            <a:pPr algn="l"/>
-            <a:r>
-              <a:rPr lang="fr-FR" b="0" i="0" dirty="0">
-                <a:effectLst/>
-                <a:latin typeface="Söhne"/>
-              </a:rPr>
-              <a:t>3. Relations &amp; Flux de Données</a:t>
-            </a:r>
-          </a:p>
-          <a:p>
-            <a:pPr algn="l">
-              <a:buFont typeface="Arial" panose="020B0604020202020204" pitchFamily="34" charset="0"/>
-              <a:buChar char="•"/>
-            </a:pPr>
-            <a:r>
-              <a:rPr lang="fr-FR" b="0" i="0" dirty="0">
-                <a:effectLst/>
-                <a:latin typeface="Söhne"/>
-              </a:rPr>
-              <a:t>Lorsqu'un utilisateur se connecte via le </a:t>
-            </a:r>
-            <a:r>
-              <a:rPr lang="fr-FR" b="1" i="0" dirty="0" err="1">
-                <a:effectLst/>
-                <a:latin typeface="Söhne"/>
-              </a:rPr>
-              <a:t>LoginPage</a:t>
-            </a:r>
-            <a:r>
-              <a:rPr lang="fr-FR" b="0" i="0" dirty="0">
-                <a:effectLst/>
-                <a:latin typeface="Söhne"/>
-              </a:rPr>
-              <a:t> </a:t>
-            </a:r>
-            <a:r>
-              <a:rPr lang="fr-FR" b="0" i="0" dirty="0" err="1">
-                <a:effectLst/>
-                <a:latin typeface="Söhne"/>
-              </a:rPr>
-              <a:t>React</a:t>
-            </a:r>
-            <a:r>
-              <a:rPr lang="fr-FR" b="0" i="0" dirty="0">
-                <a:effectLst/>
-                <a:latin typeface="Söhne"/>
-              </a:rPr>
-              <a:t>, une demande d'authentification est envoyée à l'API </a:t>
-            </a:r>
-            <a:r>
-              <a:rPr lang="fr-FR" b="0" i="0" dirty="0" err="1">
-                <a:effectLst/>
-                <a:latin typeface="Söhne"/>
-              </a:rPr>
-              <a:t>Laravel</a:t>
-            </a:r>
-            <a:r>
-              <a:rPr lang="fr-FR" b="0" i="0" dirty="0">
-                <a:effectLst/>
-                <a:latin typeface="Söhne"/>
-              </a:rPr>
-              <a:t>.</a:t>
-            </a:r>
-          </a:p>
-          <a:p>
-            <a:pPr algn="l">
-              <a:buFont typeface="Arial" panose="020B0604020202020204" pitchFamily="34" charset="0"/>
-              <a:buChar char="•"/>
-            </a:pPr>
-            <a:r>
-              <a:rPr lang="fr-FR" b="0" i="0" dirty="0">
-                <a:effectLst/>
-                <a:latin typeface="Söhne"/>
-              </a:rPr>
-              <a:t>Une fois connecté, l'application </a:t>
-            </a:r>
-            <a:r>
-              <a:rPr lang="fr-FR" b="0" i="0" dirty="0" err="1">
-                <a:effectLst/>
-                <a:latin typeface="Söhne"/>
-              </a:rPr>
-              <a:t>React</a:t>
-            </a:r>
-            <a:r>
-              <a:rPr lang="fr-FR" b="0" i="0" dirty="0">
-                <a:effectLst/>
-                <a:latin typeface="Söhne"/>
-              </a:rPr>
-              <a:t> fait des requêtes à l'API </a:t>
-            </a:r>
-            <a:r>
-              <a:rPr lang="fr-FR" b="0" i="0" dirty="0" err="1">
-                <a:effectLst/>
-                <a:latin typeface="Söhne"/>
-              </a:rPr>
-              <a:t>Laravel</a:t>
-            </a:r>
-            <a:r>
-              <a:rPr lang="fr-FR" b="0" i="0" dirty="0">
-                <a:effectLst/>
-                <a:latin typeface="Söhne"/>
-              </a:rPr>
-              <a:t> pour récupérer des données, comme le solde de l'utilisateur.</a:t>
-            </a:r>
-          </a:p>
-          <a:p>
-            <a:pPr algn="l">
-              <a:buFont typeface="Arial" panose="020B0604020202020204" pitchFamily="34" charset="0"/>
-              <a:buChar char="•"/>
-            </a:pPr>
-            <a:r>
-              <a:rPr lang="fr-FR" b="0" i="0" dirty="0">
-                <a:effectLst/>
-                <a:latin typeface="Söhne"/>
-              </a:rPr>
-              <a:t>Les transactions de cryptomonnaie peuvent être gérées et consultées via des </a:t>
-            </a:r>
-            <a:r>
-              <a:rPr lang="fr-FR" b="0" i="0" dirty="0" err="1">
-                <a:effectLst/>
-                <a:latin typeface="Söhne"/>
-              </a:rPr>
-              <a:t>endpoints</a:t>
-            </a:r>
-            <a:r>
-              <a:rPr lang="fr-FR" b="0" i="0" dirty="0">
-                <a:effectLst/>
-                <a:latin typeface="Söhne"/>
-              </a:rPr>
-              <a:t> appropriés sur le </a:t>
-            </a:r>
-            <a:r>
-              <a:rPr lang="fr-FR" b="0" i="0" dirty="0" err="1">
-                <a:effectLst/>
-                <a:latin typeface="Söhne"/>
-              </a:rPr>
-              <a:t>back-end</a:t>
-            </a:r>
-            <a:r>
-              <a:rPr lang="fr-FR" b="0" i="0" dirty="0">
-                <a:effectLst/>
-                <a:latin typeface="Söhne"/>
-              </a:rPr>
-              <a:t> </a:t>
-            </a:r>
-            <a:r>
-              <a:rPr lang="fr-FR" b="0" i="0" dirty="0" err="1">
-                <a:effectLst/>
-                <a:latin typeface="Söhne"/>
-              </a:rPr>
-              <a:t>Laravel</a:t>
-            </a:r>
-            <a:r>
-              <a:rPr lang="fr-FR" b="0" i="0" dirty="0">
-                <a:effectLst/>
-                <a:latin typeface="Söhne"/>
-              </a:rPr>
-              <a:t>.</a:t>
-            </a:r>
-          </a:p>
-          <a:p>
-            <a:pPr algn="l">
-              <a:buFont typeface="Arial" panose="020B0604020202020204" pitchFamily="34" charset="0"/>
-              <a:buChar char="•"/>
-            </a:pPr>
-            <a:r>
-              <a:rPr lang="fr-FR" b="0" i="0" dirty="0">
-                <a:effectLst/>
-                <a:latin typeface="Söhne"/>
-              </a:rPr>
-              <a:t>Les administrateurs peuvent gérer les comptes clients via le composant </a:t>
-            </a:r>
-            <a:r>
-              <a:rPr lang="fr-FR" b="1" i="0" dirty="0" err="1">
-                <a:effectLst/>
-                <a:latin typeface="Söhne"/>
-              </a:rPr>
-              <a:t>ManageClients</a:t>
-            </a:r>
-            <a:r>
-              <a:rPr lang="fr-FR" b="0" i="0" dirty="0">
-                <a:effectLst/>
-                <a:latin typeface="Söhne"/>
-              </a:rPr>
-              <a:t> et les </a:t>
-            </a:r>
-            <a:r>
-              <a:rPr lang="fr-FR" b="0" i="0" dirty="0" err="1">
-                <a:effectLst/>
-                <a:latin typeface="Söhne"/>
-              </a:rPr>
-              <a:t>endpoints</a:t>
-            </a:r>
-            <a:r>
-              <a:rPr lang="fr-FR" b="0" i="0" dirty="0">
-                <a:effectLst/>
-                <a:latin typeface="Söhne"/>
-              </a:rPr>
-              <a:t> correspondants sur le </a:t>
-            </a:r>
-            <a:r>
-              <a:rPr lang="fr-FR" b="0" i="0" dirty="0" err="1">
-                <a:effectLst/>
-                <a:latin typeface="Söhne"/>
-              </a:rPr>
-              <a:t>back-end</a:t>
-            </a:r>
-            <a:r>
-              <a:rPr lang="fr-FR" b="0" i="0" dirty="0">
-                <a:effectLst/>
-                <a:latin typeface="Söhne"/>
-              </a:rPr>
-              <a:t>.</a:t>
-            </a:r>
-          </a:p>
-          <a:p>
-            <a:endParaRPr lang="fr-FR" dirty="0"/>
+              <a:t>Consultation des cours des cryptomonnaies</a:t>
+            </a:r>
           </a:p>
           <a:p>
             <a:endParaRPr lang="fr-FR" dirty="0"/>
@@ -7167,7 +7520,7 @@
     </p:spTree>
     <p:extLst>
       <p:ext uri="{BB962C8B-B14F-4D97-AF65-F5344CB8AC3E}">
-        <p14:creationId xmlns:p14="http://schemas.microsoft.com/office/powerpoint/2010/main" val="2321957416"/>
+        <p14:creationId xmlns:p14="http://schemas.microsoft.com/office/powerpoint/2010/main" val="1113382867"/>
       </p:ext>
     </p:extLst>
   </p:cSld>
@@ -7199,7 +7552,7 @@
           <p:cNvPr id="2" name="Titre 1">
             <a:extLst>
               <a:ext uri="{FF2B5EF4-FFF2-40B4-BE49-F238E27FC236}">
-                <a16:creationId xmlns:a16="http://schemas.microsoft.com/office/drawing/2014/main" id="{89E59A98-DE35-FC37-4A7F-BC9EAEA6C427}"/>
+                <a16:creationId xmlns:a16="http://schemas.microsoft.com/office/drawing/2014/main" id="{565E8EC4-CF76-A924-F91E-B282BFC4807C}"/>
               </a:ext>
             </a:extLst>
           </p:cNvPr>
@@ -7221,7 +7574,7 @@
                 <a:effectLst/>
                 <a:latin typeface="Söhne"/>
               </a:rPr>
-              <a:t>Parcours utilisateur - Administrateur</a:t>
+              <a:t>Parcours utilisateur - Client</a:t>
             </a:r>
             <a:br>
               <a:rPr lang="fr-FR" b="1" i="0" dirty="0">
@@ -7238,7 +7591,7 @@
           <p:cNvPr id="3" name="Espace réservé du contenu 2">
             <a:extLst>
               <a:ext uri="{FF2B5EF4-FFF2-40B4-BE49-F238E27FC236}">
-                <a16:creationId xmlns:a16="http://schemas.microsoft.com/office/drawing/2014/main" id="{47231183-B936-2901-4EE9-A7AFACB4A104}"/>
+                <a16:creationId xmlns:a16="http://schemas.microsoft.com/office/drawing/2014/main" id="{2907D7AF-8650-94AA-4605-6A06F1F13EEA}"/>
               </a:ext>
             </a:extLst>
           </p:cNvPr>
@@ -7313,7 +7666,7 @@
                 <a:effectLst/>
                 <a:latin typeface="Söhne"/>
               </a:rPr>
-              <a:t>Gestion des clients: création, affichage, modification, suppression</a:t>
+              <a:t>Vue et gestion du portefeuille: contenu, solde en euro</a:t>
             </a:r>
           </a:p>
           <a:p>
@@ -7326,7 +7679,7 @@
                 <a:effectLst/>
                 <a:latin typeface="Söhne"/>
               </a:rPr>
-              <a:t>Assignation des droits</a:t>
+              <a:t>Transactions: vente et achat</a:t>
             </a:r>
           </a:p>
           <a:p>
@@ -7339,7 +7692,7 @@
                 <a:effectLst/>
                 <a:latin typeface="Söhne"/>
               </a:rPr>
-              <a:t>Consultation des cours des cryptomonnaies</a:t>
+              <a:t>Consultation des cours et historiques des cryptomonnaies</a:t>
             </a:r>
           </a:p>
           <a:p>
@@ -7350,7 +7703,7 @@
     </p:spTree>
     <p:extLst>
       <p:ext uri="{BB962C8B-B14F-4D97-AF65-F5344CB8AC3E}">
-        <p14:creationId xmlns:p14="http://schemas.microsoft.com/office/powerpoint/2010/main" val="1113382867"/>
+        <p14:creationId xmlns:p14="http://schemas.microsoft.com/office/powerpoint/2010/main" val="3829112462"/>
       </p:ext>
     </p:extLst>
   </p:cSld>

</xml_diff>